<commit_message>
push edits to day lectures
</commit_message>
<xml_diff>
--- a/Day_1/Plenary/Day_1_Plenary_OpenData.pptx
+++ b/Day_1/Plenary/Day_1_Plenary_OpenData.pptx
@@ -4,9 +4,20 @@
   <p:sldMasterIdLst>
     <p:sldMasterId id="2147483648" r:id="rId1"/>
   </p:sldMasterIdLst>
+  <p:notesMasterIdLst>
+    <p:notesMasterId r:id="rId12"/>
+  </p:notesMasterIdLst>
   <p:sldIdLst>
-    <p:sldId id="256" r:id="rId2"/>
+    <p:sldId id="258" r:id="rId2"/>
     <p:sldId id="257" r:id="rId3"/>
+    <p:sldId id="259" r:id="rId4"/>
+    <p:sldId id="260" r:id="rId5"/>
+    <p:sldId id="262" r:id="rId6"/>
+    <p:sldId id="261" r:id="rId7"/>
+    <p:sldId id="263" r:id="rId8"/>
+    <p:sldId id="256" r:id="rId9"/>
+    <p:sldId id="264" r:id="rId10"/>
+    <p:sldId id="266" r:id="rId11"/>
   </p:sldIdLst>
   <p:sldSz cx="9144000" cy="6858000" type="screen4x3"/>
   <p:notesSz cx="6858000" cy="9144000"/>
@@ -108,6 +119,458 @@
 </p:presentation>
 </file>
 
+<file path=ppt/notesMasters/notesMaster1.xml><?xml version="1.0" encoding="utf-8"?>
+<p:notesMaster xmlns:a="http://schemas.openxmlformats.org/drawingml/2006/main" xmlns:r="http://schemas.openxmlformats.org/officeDocument/2006/relationships" xmlns:p="http://schemas.openxmlformats.org/presentationml/2006/main">
+  <p:cSld>
+    <p:bg>
+      <p:bgRef idx="1001">
+        <a:schemeClr val="bg1"/>
+      </p:bgRef>
+    </p:bg>
+    <p:spTree>
+      <p:nvGrpSpPr>
+        <p:cNvPr id="1" name=""/>
+        <p:cNvGrpSpPr/>
+        <p:nvPr/>
+      </p:nvGrpSpPr>
+      <p:grpSpPr>
+        <a:xfrm>
+          <a:off x="0" y="0"/>
+          <a:ext cx="0" cy="0"/>
+          <a:chOff x="0" y="0"/>
+          <a:chExt cx="0" cy="0"/>
+        </a:xfrm>
+      </p:grpSpPr>
+      <p:sp>
+        <p:nvSpPr>
+          <p:cNvPr id="2" name="Header Placeholder 1"/>
+          <p:cNvSpPr>
+            <a:spLocks noGrp="1"/>
+          </p:cNvSpPr>
+          <p:nvPr>
+            <p:ph type="hdr" sz="quarter"/>
+          </p:nvPr>
+        </p:nvSpPr>
+        <p:spPr>
+          <a:xfrm>
+            <a:off x="0" y="0"/>
+            <a:ext cx="2971800" cy="457200"/>
+          </a:xfrm>
+          <a:prstGeom prst="rect">
+            <a:avLst/>
+          </a:prstGeom>
+        </p:spPr>
+        <p:txBody>
+          <a:bodyPr vert="horz" lIns="91440" tIns="45720" rIns="91440" bIns="45720" rtlCol="0"/>
+          <a:lstStyle>
+            <a:lvl1pPr algn="l">
+              <a:defRPr sz="1200"/>
+            </a:lvl1pPr>
+          </a:lstStyle>
+          <a:p>
+            <a:endParaRPr lang="en-US"/>
+          </a:p>
+        </p:txBody>
+      </p:sp>
+      <p:sp>
+        <p:nvSpPr>
+          <p:cNvPr id="3" name="Date Placeholder 2"/>
+          <p:cNvSpPr>
+            <a:spLocks noGrp="1"/>
+          </p:cNvSpPr>
+          <p:nvPr>
+            <p:ph type="dt" idx="1"/>
+          </p:nvPr>
+        </p:nvSpPr>
+        <p:spPr>
+          <a:xfrm>
+            <a:off x="3884613" y="0"/>
+            <a:ext cx="2971800" cy="457200"/>
+          </a:xfrm>
+          <a:prstGeom prst="rect">
+            <a:avLst/>
+          </a:prstGeom>
+        </p:spPr>
+        <p:txBody>
+          <a:bodyPr vert="horz" lIns="91440" tIns="45720" rIns="91440" bIns="45720" rtlCol="0"/>
+          <a:lstStyle>
+            <a:lvl1pPr algn="r">
+              <a:defRPr sz="1200"/>
+            </a:lvl1pPr>
+          </a:lstStyle>
+          <a:p>
+            <a:fld id="{27377218-730A-A747-A2EA-360839892EA2}" type="datetimeFigureOut">
+              <a:rPr lang="en-US" smtClean="0"/>
+              <a:t>1/7/15</a:t>
+            </a:fld>
+            <a:endParaRPr lang="en-US"/>
+          </a:p>
+        </p:txBody>
+      </p:sp>
+      <p:sp>
+        <p:nvSpPr>
+          <p:cNvPr id="4" name="Slide Image Placeholder 3"/>
+          <p:cNvSpPr>
+            <a:spLocks noGrp="1" noRot="1" noChangeAspect="1"/>
+          </p:cNvSpPr>
+          <p:nvPr>
+            <p:ph type="sldImg" idx="2"/>
+          </p:nvPr>
+        </p:nvSpPr>
+        <p:spPr>
+          <a:xfrm>
+            <a:off x="1143000" y="685800"/>
+            <a:ext cx="4572000" cy="3429000"/>
+          </a:xfrm>
+          <a:prstGeom prst="rect">
+            <a:avLst/>
+          </a:prstGeom>
+          <a:noFill/>
+          <a:ln w="12700">
+            <a:solidFill>
+              <a:prstClr val="black"/>
+            </a:solidFill>
+          </a:ln>
+        </p:spPr>
+        <p:txBody>
+          <a:bodyPr vert="horz" lIns="91440" tIns="45720" rIns="91440" bIns="45720" rtlCol="0" anchor="ctr"/>
+          <a:lstStyle/>
+          <a:p>
+            <a:endParaRPr lang="en-US"/>
+          </a:p>
+        </p:txBody>
+      </p:sp>
+      <p:sp>
+        <p:nvSpPr>
+          <p:cNvPr id="5" name="Notes Placeholder 4"/>
+          <p:cNvSpPr>
+            <a:spLocks noGrp="1"/>
+          </p:cNvSpPr>
+          <p:nvPr>
+            <p:ph type="body" sz="quarter" idx="3"/>
+          </p:nvPr>
+        </p:nvSpPr>
+        <p:spPr>
+          <a:xfrm>
+            <a:off x="685800" y="4343400"/>
+            <a:ext cx="5486400" cy="4114800"/>
+          </a:xfrm>
+          <a:prstGeom prst="rect">
+            <a:avLst/>
+          </a:prstGeom>
+        </p:spPr>
+        <p:txBody>
+          <a:bodyPr vert="horz" lIns="91440" tIns="45720" rIns="91440" bIns="45720" rtlCol="0"/>
+          <a:lstStyle/>
+          <a:p>
+            <a:pPr lvl="0"/>
+            <a:r>
+              <a:rPr lang="en-US" smtClean="0"/>
+              <a:t>Click to edit Master text styles</a:t>
+            </a:r>
+          </a:p>
+          <a:p>
+            <a:pPr lvl="1"/>
+            <a:r>
+              <a:rPr lang="en-US" smtClean="0"/>
+              <a:t>Second level</a:t>
+            </a:r>
+          </a:p>
+          <a:p>
+            <a:pPr lvl="2"/>
+            <a:r>
+              <a:rPr lang="en-US" smtClean="0"/>
+              <a:t>Third level</a:t>
+            </a:r>
+          </a:p>
+          <a:p>
+            <a:pPr lvl="3"/>
+            <a:r>
+              <a:rPr lang="en-US" smtClean="0"/>
+              <a:t>Fourth level</a:t>
+            </a:r>
+          </a:p>
+          <a:p>
+            <a:pPr lvl="4"/>
+            <a:r>
+              <a:rPr lang="en-US" smtClean="0"/>
+              <a:t>Fifth level</a:t>
+            </a:r>
+            <a:endParaRPr lang="en-US"/>
+          </a:p>
+        </p:txBody>
+      </p:sp>
+      <p:sp>
+        <p:nvSpPr>
+          <p:cNvPr id="6" name="Footer Placeholder 5"/>
+          <p:cNvSpPr>
+            <a:spLocks noGrp="1"/>
+          </p:cNvSpPr>
+          <p:nvPr>
+            <p:ph type="ftr" sz="quarter" idx="4"/>
+          </p:nvPr>
+        </p:nvSpPr>
+        <p:spPr>
+          <a:xfrm>
+            <a:off x="0" y="8685213"/>
+            <a:ext cx="2971800" cy="457200"/>
+          </a:xfrm>
+          <a:prstGeom prst="rect">
+            <a:avLst/>
+          </a:prstGeom>
+        </p:spPr>
+        <p:txBody>
+          <a:bodyPr vert="horz" lIns="91440" tIns="45720" rIns="91440" bIns="45720" rtlCol="0" anchor="b"/>
+          <a:lstStyle>
+            <a:lvl1pPr algn="l">
+              <a:defRPr sz="1200"/>
+            </a:lvl1pPr>
+          </a:lstStyle>
+          <a:p>
+            <a:endParaRPr lang="en-US"/>
+          </a:p>
+        </p:txBody>
+      </p:sp>
+      <p:sp>
+        <p:nvSpPr>
+          <p:cNvPr id="7" name="Slide Number Placeholder 6"/>
+          <p:cNvSpPr>
+            <a:spLocks noGrp="1"/>
+          </p:cNvSpPr>
+          <p:nvPr>
+            <p:ph type="sldNum" sz="quarter" idx="5"/>
+          </p:nvPr>
+        </p:nvSpPr>
+        <p:spPr>
+          <a:xfrm>
+            <a:off x="3884613" y="8685213"/>
+            <a:ext cx="2971800" cy="457200"/>
+          </a:xfrm>
+          <a:prstGeom prst="rect">
+            <a:avLst/>
+          </a:prstGeom>
+        </p:spPr>
+        <p:txBody>
+          <a:bodyPr vert="horz" lIns="91440" tIns="45720" rIns="91440" bIns="45720" rtlCol="0" anchor="b"/>
+          <a:lstStyle>
+            <a:lvl1pPr algn="r">
+              <a:defRPr sz="1200"/>
+            </a:lvl1pPr>
+          </a:lstStyle>
+          <a:p>
+            <a:fld id="{E7BCF3C9-BCDD-8D45-9AD8-23E648023F32}" type="slidenum">
+              <a:rPr lang="en-US" smtClean="0"/>
+              <a:t>‹#›</a:t>
+            </a:fld>
+            <a:endParaRPr lang="en-US"/>
+          </a:p>
+        </p:txBody>
+      </p:sp>
+    </p:spTree>
+    <p:extLst>
+      <p:ext uri="{BB962C8B-B14F-4D97-AF65-F5344CB8AC3E}">
+        <p14:creationId xmlns:p14="http://schemas.microsoft.com/office/powerpoint/2010/main" val="922039277"/>
+      </p:ext>
+    </p:extLst>
+  </p:cSld>
+  <p:clrMap bg1="lt1" tx1="dk1" bg2="lt2" tx2="dk2" accent1="accent1" accent2="accent2" accent3="accent3" accent4="accent4" accent5="accent5" accent6="accent6" hlink="hlink" folHlink="folHlink"/>
+  <p:notesStyle>
+    <a:lvl1pPr marL="0" algn="l" defTabSz="457200" rtl="0" eaLnBrk="1" latinLnBrk="0" hangingPunct="1">
+      <a:defRPr sz="1200" kern="1200">
+        <a:solidFill>
+          <a:schemeClr val="tx1"/>
+        </a:solidFill>
+        <a:latin typeface="+mn-lt"/>
+        <a:ea typeface="+mn-ea"/>
+        <a:cs typeface="+mn-cs"/>
+      </a:defRPr>
+    </a:lvl1pPr>
+    <a:lvl2pPr marL="457200" algn="l" defTabSz="457200" rtl="0" eaLnBrk="1" latinLnBrk="0" hangingPunct="1">
+      <a:defRPr sz="1200" kern="1200">
+        <a:solidFill>
+          <a:schemeClr val="tx1"/>
+        </a:solidFill>
+        <a:latin typeface="+mn-lt"/>
+        <a:ea typeface="+mn-ea"/>
+        <a:cs typeface="+mn-cs"/>
+      </a:defRPr>
+    </a:lvl2pPr>
+    <a:lvl3pPr marL="914400" algn="l" defTabSz="457200" rtl="0" eaLnBrk="1" latinLnBrk="0" hangingPunct="1">
+      <a:defRPr sz="1200" kern="1200">
+        <a:solidFill>
+          <a:schemeClr val="tx1"/>
+        </a:solidFill>
+        <a:latin typeface="+mn-lt"/>
+        <a:ea typeface="+mn-ea"/>
+        <a:cs typeface="+mn-cs"/>
+      </a:defRPr>
+    </a:lvl3pPr>
+    <a:lvl4pPr marL="1371600" algn="l" defTabSz="457200" rtl="0" eaLnBrk="1" latinLnBrk="0" hangingPunct="1">
+      <a:defRPr sz="1200" kern="1200">
+        <a:solidFill>
+          <a:schemeClr val="tx1"/>
+        </a:solidFill>
+        <a:latin typeface="+mn-lt"/>
+        <a:ea typeface="+mn-ea"/>
+        <a:cs typeface="+mn-cs"/>
+      </a:defRPr>
+    </a:lvl4pPr>
+    <a:lvl5pPr marL="1828800" algn="l" defTabSz="457200" rtl="0" eaLnBrk="1" latinLnBrk="0" hangingPunct="1">
+      <a:defRPr sz="1200" kern="1200">
+        <a:solidFill>
+          <a:schemeClr val="tx1"/>
+        </a:solidFill>
+        <a:latin typeface="+mn-lt"/>
+        <a:ea typeface="+mn-ea"/>
+        <a:cs typeface="+mn-cs"/>
+      </a:defRPr>
+    </a:lvl5pPr>
+    <a:lvl6pPr marL="2286000" algn="l" defTabSz="457200" rtl="0" eaLnBrk="1" latinLnBrk="0" hangingPunct="1">
+      <a:defRPr sz="1200" kern="1200">
+        <a:solidFill>
+          <a:schemeClr val="tx1"/>
+        </a:solidFill>
+        <a:latin typeface="+mn-lt"/>
+        <a:ea typeface="+mn-ea"/>
+        <a:cs typeface="+mn-cs"/>
+      </a:defRPr>
+    </a:lvl6pPr>
+    <a:lvl7pPr marL="2743200" algn="l" defTabSz="457200" rtl="0" eaLnBrk="1" latinLnBrk="0" hangingPunct="1">
+      <a:defRPr sz="1200" kern="1200">
+        <a:solidFill>
+          <a:schemeClr val="tx1"/>
+        </a:solidFill>
+        <a:latin typeface="+mn-lt"/>
+        <a:ea typeface="+mn-ea"/>
+        <a:cs typeface="+mn-cs"/>
+      </a:defRPr>
+    </a:lvl7pPr>
+    <a:lvl8pPr marL="3200400" algn="l" defTabSz="457200" rtl="0" eaLnBrk="1" latinLnBrk="0" hangingPunct="1">
+      <a:defRPr sz="1200" kern="1200">
+        <a:solidFill>
+          <a:schemeClr val="tx1"/>
+        </a:solidFill>
+        <a:latin typeface="+mn-lt"/>
+        <a:ea typeface="+mn-ea"/>
+        <a:cs typeface="+mn-cs"/>
+      </a:defRPr>
+    </a:lvl8pPr>
+    <a:lvl9pPr marL="3657600" algn="l" defTabSz="457200" rtl="0" eaLnBrk="1" latinLnBrk="0" hangingPunct="1">
+      <a:defRPr sz="1200" kern="1200">
+        <a:solidFill>
+          <a:schemeClr val="tx1"/>
+        </a:solidFill>
+        <a:latin typeface="+mn-lt"/>
+        <a:ea typeface="+mn-ea"/>
+        <a:cs typeface="+mn-cs"/>
+      </a:defRPr>
+    </a:lvl9pPr>
+  </p:notesStyle>
+</p:notesMaster>
+</file>
+
+<file path=ppt/notesSlides/notesSlide1.xml><?xml version="1.0" encoding="utf-8"?>
+<p:notes xmlns:a="http://schemas.openxmlformats.org/drawingml/2006/main" xmlns:r="http://schemas.openxmlformats.org/officeDocument/2006/relationships" xmlns:p="http://schemas.openxmlformats.org/presentationml/2006/main">
+  <p:cSld>
+    <p:spTree>
+      <p:nvGrpSpPr>
+        <p:cNvPr id="1" name=""/>
+        <p:cNvGrpSpPr/>
+        <p:nvPr/>
+      </p:nvGrpSpPr>
+      <p:grpSpPr>
+        <a:xfrm>
+          <a:off x="0" y="0"/>
+          <a:ext cx="0" cy="0"/>
+          <a:chOff x="0" y="0"/>
+          <a:chExt cx="0" cy="0"/>
+        </a:xfrm>
+      </p:grpSpPr>
+      <p:sp>
+        <p:nvSpPr>
+          <p:cNvPr id="2" name="Slide Image Placeholder 1"/>
+          <p:cNvSpPr>
+            <a:spLocks noGrp="1" noRot="1" noChangeAspect="1"/>
+          </p:cNvSpPr>
+          <p:nvPr>
+            <p:ph type="sldImg"/>
+          </p:nvPr>
+        </p:nvSpPr>
+        <p:spPr/>
+      </p:sp>
+      <p:sp>
+        <p:nvSpPr>
+          <p:cNvPr id="3" name="Notes Placeholder 2"/>
+          <p:cNvSpPr>
+            <a:spLocks noGrp="1"/>
+          </p:cNvSpPr>
+          <p:nvPr>
+            <p:ph type="body" idx="1"/>
+          </p:nvPr>
+        </p:nvSpPr>
+        <p:spPr/>
+        <p:txBody>
+          <a:bodyPr/>
+          <a:lstStyle/>
+          <a:p>
+            <a:r>
+              <a:rPr lang="en-US" dirty="0" smtClean="0"/>
+              <a:t>We should want to improve this process,</a:t>
+            </a:r>
+            <a:r>
+              <a:rPr lang="en-US" baseline="0" dirty="0" smtClean="0"/>
+              <a:t> not only because it saves money ,,, but because it is the only tenable way to move research forward… think about how much time our students will spend doing these activities as the result of federal </a:t>
+            </a:r>
+            <a:r>
+              <a:rPr lang="en-US" baseline="0" dirty="0" err="1" smtClean="0"/>
+              <a:t>initatives</a:t>
+            </a:r>
+            <a:endParaRPr lang="en-US" baseline="0" dirty="0" smtClean="0"/>
+          </a:p>
+          <a:p>
+            <a:endParaRPr lang="en-US" baseline="0" dirty="0" smtClean="0"/>
+          </a:p>
+          <a:p>
+            <a:endParaRPr lang="en-US" dirty="0"/>
+          </a:p>
+        </p:txBody>
+      </p:sp>
+      <p:sp>
+        <p:nvSpPr>
+          <p:cNvPr id="4" name="Slide Number Placeholder 3"/>
+          <p:cNvSpPr>
+            <a:spLocks noGrp="1"/>
+          </p:cNvSpPr>
+          <p:nvPr>
+            <p:ph type="sldNum" sz="quarter" idx="10"/>
+          </p:nvPr>
+        </p:nvSpPr>
+        <p:spPr/>
+        <p:txBody>
+          <a:bodyPr/>
+          <a:lstStyle/>
+          <a:p>
+            <a:fld id="{E7BCF3C9-BCDD-8D45-9AD8-23E648023F32}" type="slidenum">
+              <a:rPr lang="en-US" smtClean="0"/>
+              <a:t>6</a:t>
+            </a:fld>
+            <a:endParaRPr lang="en-US"/>
+          </a:p>
+        </p:txBody>
+      </p:sp>
+    </p:spTree>
+    <p:extLst>
+      <p:ext uri="{BB962C8B-B14F-4D97-AF65-F5344CB8AC3E}">
+        <p14:creationId xmlns:p14="http://schemas.microsoft.com/office/powerpoint/2010/main" val="1375266549"/>
+      </p:ext>
+    </p:extLst>
+  </p:cSld>
+  <p:clrMapOvr>
+    <a:masterClrMapping/>
+  </p:clrMapOvr>
+</p:notes>
+</file>
+
 <file path=ppt/slideLayouts/slideLayout1.xml><?xml version="1.0" encoding="utf-8"?>
 <p:sldLayout xmlns:a="http://schemas.openxmlformats.org/drawingml/2006/main" xmlns:r="http://schemas.openxmlformats.org/officeDocument/2006/relationships" xmlns:p="http://schemas.openxmlformats.org/presentationml/2006/main" type="title" preserve="1">
   <p:cSld name="Title Slide">
@@ -289,7 +752,7 @@
           <a:p>
             <a:fld id="{89ACF3DB-EC51-3840-900F-470751CD5404}" type="datetimeFigureOut">
               <a:rPr lang="en-US" smtClean="0"/>
-              <a:t>12/26/14</a:t>
+              <a:t>1/7/15</a:t>
             </a:fld>
             <a:endParaRPr lang="en-US"/>
           </a:p>
@@ -459,7 +922,7 @@
           <a:p>
             <a:fld id="{89ACF3DB-EC51-3840-900F-470751CD5404}" type="datetimeFigureOut">
               <a:rPr lang="en-US" smtClean="0"/>
-              <a:t>12/26/14</a:t>
+              <a:t>1/7/15</a:t>
             </a:fld>
             <a:endParaRPr lang="en-US"/>
           </a:p>
@@ -639,7 +1102,7 @@
           <a:p>
             <a:fld id="{89ACF3DB-EC51-3840-900F-470751CD5404}" type="datetimeFigureOut">
               <a:rPr lang="en-US" smtClean="0"/>
-              <a:t>12/26/14</a:t>
+              <a:t>1/7/15</a:t>
             </a:fld>
             <a:endParaRPr lang="en-US"/>
           </a:p>
@@ -809,7 +1272,7 @@
           <a:p>
             <a:fld id="{89ACF3DB-EC51-3840-900F-470751CD5404}" type="datetimeFigureOut">
               <a:rPr lang="en-US" smtClean="0"/>
-              <a:t>12/26/14</a:t>
+              <a:t>1/7/15</a:t>
             </a:fld>
             <a:endParaRPr lang="en-US"/>
           </a:p>
@@ -1055,7 +1518,7 @@
           <a:p>
             <a:fld id="{89ACF3DB-EC51-3840-900F-470751CD5404}" type="datetimeFigureOut">
               <a:rPr lang="en-US" smtClean="0"/>
-              <a:t>12/26/14</a:t>
+              <a:t>1/7/15</a:t>
             </a:fld>
             <a:endParaRPr lang="en-US"/>
           </a:p>
@@ -1343,7 +1806,7 @@
           <a:p>
             <a:fld id="{89ACF3DB-EC51-3840-900F-470751CD5404}" type="datetimeFigureOut">
               <a:rPr lang="en-US" smtClean="0"/>
-              <a:t>12/26/14</a:t>
+              <a:t>1/7/15</a:t>
             </a:fld>
             <a:endParaRPr lang="en-US"/>
           </a:p>
@@ -1765,7 +2228,7 @@
           <a:p>
             <a:fld id="{89ACF3DB-EC51-3840-900F-470751CD5404}" type="datetimeFigureOut">
               <a:rPr lang="en-US" smtClean="0"/>
-              <a:t>12/26/14</a:t>
+              <a:t>1/7/15</a:t>
             </a:fld>
             <a:endParaRPr lang="en-US"/>
           </a:p>
@@ -1883,7 +2346,7 @@
           <a:p>
             <a:fld id="{89ACF3DB-EC51-3840-900F-470751CD5404}" type="datetimeFigureOut">
               <a:rPr lang="en-US" smtClean="0"/>
-              <a:t>12/26/14</a:t>
+              <a:t>1/7/15</a:t>
             </a:fld>
             <a:endParaRPr lang="en-US"/>
           </a:p>
@@ -1978,7 +2441,7 @@
           <a:p>
             <a:fld id="{89ACF3DB-EC51-3840-900F-470751CD5404}" type="datetimeFigureOut">
               <a:rPr lang="en-US" smtClean="0"/>
-              <a:t>12/26/14</a:t>
+              <a:t>1/7/15</a:t>
             </a:fld>
             <a:endParaRPr lang="en-US"/>
           </a:p>
@@ -2255,7 +2718,7 @@
           <a:p>
             <a:fld id="{89ACF3DB-EC51-3840-900F-470751CD5404}" type="datetimeFigureOut">
               <a:rPr lang="en-US" smtClean="0"/>
-              <a:t>12/26/14</a:t>
+              <a:t>1/7/15</a:t>
             </a:fld>
             <a:endParaRPr lang="en-US"/>
           </a:p>
@@ -2508,7 +2971,7 @@
           <a:p>
             <a:fld id="{89ACF3DB-EC51-3840-900F-470751CD5404}" type="datetimeFigureOut">
               <a:rPr lang="en-US" smtClean="0"/>
-              <a:t>12/26/14</a:t>
+              <a:t>1/7/15</a:t>
             </a:fld>
             <a:endParaRPr lang="en-US"/>
           </a:p>
@@ -2721,7 +3184,7 @@
           <a:p>
             <a:fld id="{89ACF3DB-EC51-3840-900F-470751CD5404}" type="datetimeFigureOut">
               <a:rPr lang="en-US" smtClean="0"/>
-              <a:t>12/26/14</a:t>
+              <a:t>1/7/15</a:t>
             </a:fld>
             <a:endParaRPr lang="en-US"/>
           </a:p>
@@ -3096,6 +3559,940 @@
           <a:chExt cx="0" cy="0"/>
         </a:xfrm>
       </p:grpSpPr>
+      <p:sp>
+        <p:nvSpPr>
+          <p:cNvPr id="4" name="Title 3"/>
+          <p:cNvSpPr>
+            <a:spLocks noGrp="1"/>
+          </p:cNvSpPr>
+          <p:nvPr>
+            <p:ph type="ctrTitle"/>
+          </p:nvPr>
+        </p:nvSpPr>
+        <p:spPr>
+          <a:xfrm>
+            <a:off x="609976" y="660400"/>
+            <a:ext cx="7772400" cy="1470025"/>
+          </a:xfrm>
+        </p:spPr>
+        <p:txBody>
+          <a:bodyPr>
+            <a:normAutofit/>
+          </a:bodyPr>
+          <a:lstStyle/>
+          <a:p>
+            <a:r>
+              <a:rPr lang="en-US" dirty="0" smtClean="0"/>
+              <a:t>Open Data &amp; Scholarly Communications</a:t>
+            </a:r>
+            <a:endParaRPr lang="en-US" dirty="0"/>
+          </a:p>
+        </p:txBody>
+      </p:sp>
+      <p:sp>
+        <p:nvSpPr>
+          <p:cNvPr id="5" name="Subtitle 4"/>
+          <p:cNvSpPr>
+            <a:spLocks noGrp="1"/>
+          </p:cNvSpPr>
+          <p:nvPr>
+            <p:ph type="subTitle" idx="1"/>
+          </p:nvPr>
+        </p:nvSpPr>
+        <p:spPr/>
+        <p:txBody>
+          <a:bodyPr/>
+          <a:lstStyle/>
+          <a:p>
+            <a:r>
+              <a:rPr lang="en-US" dirty="0" smtClean="0"/>
+              <a:t>Nic Weber</a:t>
+            </a:r>
+          </a:p>
+          <a:p>
+            <a:r>
+              <a:rPr lang="en-US" dirty="0" smtClean="0"/>
+              <a:t>University of Hong Kong	</a:t>
+            </a:r>
+          </a:p>
+          <a:p>
+            <a:r>
+              <a:rPr lang="en-US" dirty="0" smtClean="0"/>
+              <a:t>February 2015</a:t>
+            </a:r>
+            <a:endParaRPr lang="en-US" dirty="0"/>
+          </a:p>
+        </p:txBody>
+      </p:sp>
+      <p:sp>
+        <p:nvSpPr>
+          <p:cNvPr id="6" name="Rectangle 5"/>
+          <p:cNvSpPr/>
+          <p:nvPr/>
+        </p:nvSpPr>
+        <p:spPr>
+          <a:xfrm>
+            <a:off x="2642067" y="2242189"/>
+            <a:ext cx="4135755" cy="369332"/>
+          </a:xfrm>
+          <a:prstGeom prst="rect">
+            <a:avLst/>
+          </a:prstGeom>
+        </p:spPr>
+        <p:txBody>
+          <a:bodyPr wrap="none">
+            <a:spAutoFit/>
+          </a:bodyPr>
+          <a:lstStyle/>
+          <a:p>
+            <a:r>
+              <a:rPr lang="en-US" dirty="0" smtClean="0"/>
+              <a:t>Some  Context for </a:t>
+            </a:r>
+            <a:r>
+              <a:rPr lang="en-US" dirty="0"/>
+              <a:t>Research Data Curation</a:t>
+            </a:r>
+          </a:p>
+        </p:txBody>
+      </p:sp>
+    </p:spTree>
+    <p:extLst>
+      <p:ext uri="{BB962C8B-B14F-4D97-AF65-F5344CB8AC3E}">
+        <p14:creationId xmlns:p14="http://schemas.microsoft.com/office/powerpoint/2010/main" val="891003481"/>
+      </p:ext>
+    </p:extLst>
+  </p:cSld>
+  <p:clrMapOvr>
+    <a:masterClrMapping/>
+  </p:clrMapOvr>
+</p:sld>
+</file>
+
+<file path=ppt/slides/slide10.xml><?xml version="1.0" encoding="utf-8"?>
+<p:sld xmlns:a="http://schemas.openxmlformats.org/drawingml/2006/main" xmlns:r="http://schemas.openxmlformats.org/officeDocument/2006/relationships" xmlns:p="http://schemas.openxmlformats.org/presentationml/2006/main">
+  <p:cSld>
+    <p:spTree>
+      <p:nvGrpSpPr>
+        <p:cNvPr id="1" name=""/>
+        <p:cNvGrpSpPr/>
+        <p:nvPr/>
+      </p:nvGrpSpPr>
+      <p:grpSpPr>
+        <a:xfrm>
+          <a:off x="0" y="0"/>
+          <a:ext cx="0" cy="0"/>
+          <a:chOff x="0" y="0"/>
+          <a:chExt cx="0" cy="0"/>
+        </a:xfrm>
+      </p:grpSpPr>
+      <p:pic>
+        <p:nvPicPr>
+          <p:cNvPr id="2" name="Picture 1" descr="Screen Shot 2015-01-07 at 4.19.10 PM.png"/>
+          <p:cNvPicPr>
+            <a:picLocks noChangeAspect="1"/>
+          </p:cNvPicPr>
+          <p:nvPr/>
+        </p:nvPicPr>
+        <p:blipFill>
+          <a:blip r:embed="rId2">
+            <a:extLst>
+              <a:ext uri="{28A0092B-C50C-407E-A947-70E740481C1C}">
+                <a14:useLocalDpi xmlns:a14="http://schemas.microsoft.com/office/drawing/2010/main" val="0"/>
+              </a:ext>
+            </a:extLst>
+          </a:blip>
+          <a:stretch>
+            <a:fillRect/>
+          </a:stretch>
+        </p:blipFill>
+        <p:spPr>
+          <a:xfrm>
+            <a:off x="102188" y="846757"/>
+            <a:ext cx="8892273" cy="4417228"/>
+          </a:xfrm>
+          <a:prstGeom prst="rect">
+            <a:avLst/>
+          </a:prstGeom>
+        </p:spPr>
+      </p:pic>
+      <p:sp>
+        <p:nvSpPr>
+          <p:cNvPr id="3" name="Rectangle 2"/>
+          <p:cNvSpPr/>
+          <p:nvPr/>
+        </p:nvSpPr>
+        <p:spPr>
+          <a:xfrm>
+            <a:off x="3460157" y="6091189"/>
+            <a:ext cx="2223686" cy="369332"/>
+          </a:xfrm>
+          <a:prstGeom prst="rect">
+            <a:avLst/>
+          </a:prstGeom>
+        </p:spPr>
+        <p:txBody>
+          <a:bodyPr wrap="none">
+            <a:spAutoFit/>
+          </a:bodyPr>
+          <a:lstStyle/>
+          <a:p>
+            <a:r>
+              <a:rPr lang="en-US" dirty="0"/>
+              <a:t>http://5stardata.info/</a:t>
+            </a:r>
+          </a:p>
+        </p:txBody>
+      </p:sp>
+    </p:spTree>
+    <p:extLst>
+      <p:ext uri="{BB962C8B-B14F-4D97-AF65-F5344CB8AC3E}">
+        <p14:creationId xmlns:p14="http://schemas.microsoft.com/office/powerpoint/2010/main" val="3821362691"/>
+      </p:ext>
+    </p:extLst>
+  </p:cSld>
+  <p:clrMapOvr>
+    <a:masterClrMapping/>
+  </p:clrMapOvr>
+</p:sld>
+</file>
+
+<file path=ppt/slides/slide2.xml><?xml version="1.0" encoding="utf-8"?>
+<p:sld xmlns:a="http://schemas.openxmlformats.org/drawingml/2006/main" xmlns:r="http://schemas.openxmlformats.org/officeDocument/2006/relationships" xmlns:p="http://schemas.openxmlformats.org/presentationml/2006/main">
+  <p:cSld>
+    <p:spTree>
+      <p:nvGrpSpPr>
+        <p:cNvPr id="1" name=""/>
+        <p:cNvGrpSpPr/>
+        <p:nvPr/>
+      </p:nvGrpSpPr>
+      <p:grpSpPr>
+        <a:xfrm>
+          <a:off x="0" y="0"/>
+          <a:ext cx="0" cy="0"/>
+          <a:chOff x="0" y="0"/>
+          <a:chExt cx="0" cy="0"/>
+        </a:xfrm>
+      </p:grpSpPr>
+      <p:pic>
+        <p:nvPicPr>
+          <p:cNvPr id="4" name="Picture 3"/>
+          <p:cNvPicPr>
+            <a:picLocks noChangeAspect="1"/>
+          </p:cNvPicPr>
+          <p:nvPr/>
+        </p:nvPicPr>
+        <p:blipFill>
+          <a:blip r:embed="rId2"/>
+          <a:stretch>
+            <a:fillRect/>
+          </a:stretch>
+        </p:blipFill>
+        <p:spPr>
+          <a:xfrm>
+            <a:off x="2008374" y="2693122"/>
+            <a:ext cx="4790368" cy="2689976"/>
+          </a:xfrm>
+          <a:prstGeom prst="rect">
+            <a:avLst/>
+          </a:prstGeom>
+        </p:spPr>
+      </p:pic>
+      <p:sp>
+        <p:nvSpPr>
+          <p:cNvPr id="2" name="Rectangle 1"/>
+          <p:cNvSpPr/>
+          <p:nvPr/>
+        </p:nvSpPr>
+        <p:spPr>
+          <a:xfrm>
+            <a:off x="1252886" y="6566546"/>
+            <a:ext cx="6642373" cy="215444"/>
+          </a:xfrm>
+          <a:prstGeom prst="rect">
+            <a:avLst/>
+          </a:prstGeom>
+        </p:spPr>
+        <p:txBody>
+          <a:bodyPr wrap="square">
+            <a:spAutoFit/>
+          </a:bodyPr>
+          <a:lstStyle/>
+          <a:p>
+            <a:r>
+              <a:rPr lang="en-US" sz="800" dirty="0"/>
+              <a:t>http://</a:t>
+            </a:r>
+            <a:r>
+              <a:rPr lang="en-US" sz="800" dirty="0" err="1"/>
+              <a:t>opensource.com</a:t>
+            </a:r>
+            <a:r>
+              <a:rPr lang="en-US" sz="800" dirty="0"/>
+              <a:t>/sites/default/files/styles/image-full-size/public/images/government/</a:t>
+            </a:r>
+            <a:r>
+              <a:rPr lang="en-US" sz="800" dirty="0" err="1"/>
+              <a:t>OSCD_GOV_open_data_standards.png?itok</a:t>
+            </a:r>
+            <a:r>
+              <a:rPr lang="en-US" sz="800" dirty="0"/>
+              <a:t>=igpITdY0</a:t>
+            </a:r>
+          </a:p>
+        </p:txBody>
+      </p:sp>
+    </p:spTree>
+    <p:extLst>
+      <p:ext uri="{BB962C8B-B14F-4D97-AF65-F5344CB8AC3E}">
+        <p14:creationId xmlns:p14="http://schemas.microsoft.com/office/powerpoint/2010/main" val="2537751626"/>
+      </p:ext>
+    </p:extLst>
+  </p:cSld>
+  <p:clrMapOvr>
+    <a:masterClrMapping/>
+  </p:clrMapOvr>
+</p:sld>
+</file>
+
+<file path=ppt/slides/slide3.xml><?xml version="1.0" encoding="utf-8"?>
+<p:sld xmlns:a="http://schemas.openxmlformats.org/drawingml/2006/main" xmlns:r="http://schemas.openxmlformats.org/officeDocument/2006/relationships" xmlns:p="http://schemas.openxmlformats.org/presentationml/2006/main">
+  <p:cSld>
+    <p:spTree>
+      <p:nvGrpSpPr>
+        <p:cNvPr id="1" name=""/>
+        <p:cNvGrpSpPr/>
+        <p:nvPr/>
+      </p:nvGrpSpPr>
+      <p:grpSpPr>
+        <a:xfrm>
+          <a:off x="0" y="0"/>
+          <a:ext cx="0" cy="0"/>
+          <a:chOff x="0" y="0"/>
+          <a:chExt cx="0" cy="0"/>
+        </a:xfrm>
+      </p:grpSpPr>
+      <p:sp>
+        <p:nvSpPr>
+          <p:cNvPr id="2" name="Title 1"/>
+          <p:cNvSpPr>
+            <a:spLocks noGrp="1"/>
+          </p:cNvSpPr>
+          <p:nvPr>
+            <p:ph type="title"/>
+          </p:nvPr>
+        </p:nvSpPr>
+        <p:spPr>
+          <a:xfrm>
+            <a:off x="352941" y="274638"/>
+            <a:ext cx="8229600" cy="1143000"/>
+          </a:xfrm>
+        </p:spPr>
+        <p:txBody>
+          <a:bodyPr/>
+          <a:lstStyle/>
+          <a:p>
+            <a:r>
+              <a:rPr lang="en-US" dirty="0" smtClean="0">
+                <a:solidFill>
+                  <a:schemeClr val="bg1">
+                    <a:lumMod val="65000"/>
+                  </a:schemeClr>
+                </a:solidFill>
+              </a:rPr>
+              <a:t>Agenda</a:t>
+            </a:r>
+            <a:endParaRPr lang="en-US" dirty="0">
+              <a:solidFill>
+                <a:schemeClr val="bg1">
+                  <a:lumMod val="65000"/>
+                </a:schemeClr>
+              </a:solidFill>
+            </a:endParaRPr>
+          </a:p>
+        </p:txBody>
+      </p:sp>
+      <p:sp>
+        <p:nvSpPr>
+          <p:cNvPr id="3" name="Content Placeholder 2"/>
+          <p:cNvSpPr>
+            <a:spLocks noGrp="1"/>
+          </p:cNvSpPr>
+          <p:nvPr>
+            <p:ph idx="1"/>
+          </p:nvPr>
+        </p:nvSpPr>
+        <p:spPr/>
+        <p:txBody>
+          <a:bodyPr>
+            <a:normAutofit lnSpcReduction="10000"/>
+          </a:bodyPr>
+          <a:lstStyle/>
+          <a:p>
+            <a:pPr marL="0" indent="0">
+              <a:buNone/>
+            </a:pPr>
+            <a:r>
+              <a:rPr lang="en-US" b="1" dirty="0" smtClean="0"/>
+              <a:t>The Context of Research Data Curation</a:t>
+            </a:r>
+          </a:p>
+          <a:p>
+            <a:pPr lvl="1">
+              <a:buFontTx/>
+              <a:buChar char="-"/>
+            </a:pPr>
+            <a:r>
+              <a:rPr lang="en-US" dirty="0" smtClean="0"/>
+              <a:t>Economic Investment in Public Goods</a:t>
+            </a:r>
+          </a:p>
+          <a:p>
+            <a:pPr lvl="1">
+              <a:buFontTx/>
+              <a:buChar char="-"/>
+            </a:pPr>
+            <a:r>
+              <a:rPr lang="en-US" dirty="0" smtClean="0"/>
+              <a:t>Reproducibility of New Knowledge</a:t>
+            </a:r>
+          </a:p>
+          <a:p>
+            <a:pPr marL="0" indent="0">
+              <a:buNone/>
+            </a:pPr>
+            <a:r>
+              <a:rPr lang="en-US" b="1" dirty="0" smtClean="0"/>
+              <a:t>Open Data</a:t>
+            </a:r>
+          </a:p>
+          <a:p>
+            <a:pPr lvl="1">
+              <a:buFontTx/>
+              <a:buChar char="-"/>
+            </a:pPr>
+            <a:r>
+              <a:rPr lang="en-US" dirty="0" smtClean="0"/>
+              <a:t>Government + Commercial Sector</a:t>
+            </a:r>
+          </a:p>
+          <a:p>
+            <a:pPr lvl="1">
+              <a:buFontTx/>
+              <a:buChar char="-"/>
+            </a:pPr>
+            <a:r>
+              <a:rPr lang="en-US" dirty="0" smtClean="0"/>
+              <a:t>Research + Higher Education</a:t>
+            </a:r>
+          </a:p>
+          <a:p>
+            <a:pPr marL="0" indent="0">
+              <a:buNone/>
+            </a:pPr>
+            <a:r>
+              <a:rPr lang="en-US" b="1" dirty="0" smtClean="0"/>
+              <a:t>Scholarly Communications</a:t>
+            </a:r>
+          </a:p>
+          <a:p>
+            <a:pPr lvl="1">
+              <a:buFontTx/>
+              <a:buChar char="-"/>
+            </a:pPr>
+            <a:r>
+              <a:rPr lang="en-US" dirty="0" smtClean="0"/>
+              <a:t>Decoupling the scholarly record</a:t>
+            </a:r>
+          </a:p>
+          <a:p>
+            <a:pPr lvl="1">
+              <a:buFontTx/>
+              <a:buChar char="-"/>
+            </a:pPr>
+            <a:r>
+              <a:rPr lang="en-US" dirty="0" smtClean="0"/>
+              <a:t>Research Objects as first-class   </a:t>
+            </a:r>
+            <a:endParaRPr lang="en-US" dirty="0"/>
+          </a:p>
+        </p:txBody>
+      </p:sp>
+    </p:spTree>
+    <p:extLst>
+      <p:ext uri="{BB962C8B-B14F-4D97-AF65-F5344CB8AC3E}">
+        <p14:creationId xmlns:p14="http://schemas.microsoft.com/office/powerpoint/2010/main" val="1970159385"/>
+      </p:ext>
+    </p:extLst>
+  </p:cSld>
+  <p:clrMapOvr>
+    <a:masterClrMapping/>
+  </p:clrMapOvr>
+</p:sld>
+</file>
+
+<file path=ppt/slides/slide4.xml><?xml version="1.0" encoding="utf-8"?>
+<p:sld xmlns:a="http://schemas.openxmlformats.org/drawingml/2006/main" xmlns:r="http://schemas.openxmlformats.org/officeDocument/2006/relationships" xmlns:p="http://schemas.openxmlformats.org/presentationml/2006/main">
+  <p:cSld>
+    <p:spTree>
+      <p:nvGrpSpPr>
+        <p:cNvPr id="1" name=""/>
+        <p:cNvGrpSpPr/>
+        <p:nvPr/>
+      </p:nvGrpSpPr>
+      <p:grpSpPr>
+        <a:xfrm>
+          <a:off x="0" y="0"/>
+          <a:ext cx="0" cy="0"/>
+          <a:chOff x="0" y="0"/>
+          <a:chExt cx="0" cy="0"/>
+        </a:xfrm>
+      </p:grpSpPr>
+      <p:sp>
+        <p:nvSpPr>
+          <p:cNvPr id="2" name="Title 1"/>
+          <p:cNvSpPr>
+            <a:spLocks noGrp="1"/>
+          </p:cNvSpPr>
+          <p:nvPr>
+            <p:ph type="title"/>
+          </p:nvPr>
+        </p:nvSpPr>
+        <p:spPr>
+          <a:xfrm>
+            <a:off x="457200" y="3117824"/>
+            <a:ext cx="8229600" cy="1143000"/>
+          </a:xfrm>
+        </p:spPr>
+        <p:txBody>
+          <a:bodyPr/>
+          <a:lstStyle/>
+          <a:p>
+            <a:r>
+              <a:rPr lang="en-US" dirty="0" smtClean="0"/>
+              <a:t>2 Quick Examples</a:t>
+            </a:r>
+            <a:endParaRPr lang="en-US" dirty="0"/>
+          </a:p>
+        </p:txBody>
+      </p:sp>
+    </p:spTree>
+    <p:extLst>
+      <p:ext uri="{BB962C8B-B14F-4D97-AF65-F5344CB8AC3E}">
+        <p14:creationId xmlns:p14="http://schemas.microsoft.com/office/powerpoint/2010/main" val="2668410991"/>
+      </p:ext>
+    </p:extLst>
+  </p:cSld>
+  <p:clrMapOvr>
+    <a:masterClrMapping/>
+  </p:clrMapOvr>
+</p:sld>
+</file>
+
+<file path=ppt/slides/slide5.xml><?xml version="1.0" encoding="utf-8"?>
+<p:sld xmlns:a="http://schemas.openxmlformats.org/drawingml/2006/main" xmlns:r="http://schemas.openxmlformats.org/officeDocument/2006/relationships" xmlns:p="http://schemas.openxmlformats.org/presentationml/2006/main">
+  <p:cSld>
+    <p:spTree>
+      <p:nvGrpSpPr>
+        <p:cNvPr id="1" name=""/>
+        <p:cNvGrpSpPr/>
+        <p:nvPr/>
+      </p:nvGrpSpPr>
+      <p:grpSpPr>
+        <a:xfrm>
+          <a:off x="0" y="0"/>
+          <a:ext cx="0" cy="0"/>
+          <a:chOff x="0" y="0"/>
+          <a:chExt cx="0" cy="0"/>
+        </a:xfrm>
+      </p:grpSpPr>
+      <p:sp>
+        <p:nvSpPr>
+          <p:cNvPr id="2" name="Title 1"/>
+          <p:cNvSpPr>
+            <a:spLocks noGrp="1"/>
+          </p:cNvSpPr>
+          <p:nvPr>
+            <p:ph type="title"/>
+          </p:nvPr>
+        </p:nvSpPr>
+        <p:spPr>
+          <a:xfrm>
+            <a:off x="457200" y="3117824"/>
+            <a:ext cx="8229600" cy="1143000"/>
+          </a:xfrm>
+        </p:spPr>
+        <p:txBody>
+          <a:bodyPr>
+            <a:normAutofit fontScale="90000"/>
+          </a:bodyPr>
+          <a:lstStyle/>
+          <a:p>
+            <a:r>
+              <a:rPr lang="en-US" dirty="0" smtClean="0"/>
+              <a:t>1</a:t>
+            </a:r>
+            <a:r>
+              <a:rPr lang="en-US" baseline="30000" dirty="0" smtClean="0"/>
+              <a:t>st</a:t>
+            </a:r>
+            <a:r>
+              <a:rPr lang="en-US" dirty="0" smtClean="0"/>
+              <a:t> Example: The cost of Open Science</a:t>
+            </a:r>
+            <a:endParaRPr lang="en-US" dirty="0"/>
+          </a:p>
+        </p:txBody>
+      </p:sp>
+    </p:spTree>
+    <p:extLst>
+      <p:ext uri="{BB962C8B-B14F-4D97-AF65-F5344CB8AC3E}">
+        <p14:creationId xmlns:p14="http://schemas.microsoft.com/office/powerpoint/2010/main" val="3552019336"/>
+      </p:ext>
+    </p:extLst>
+  </p:cSld>
+  <p:clrMapOvr>
+    <a:masterClrMapping/>
+  </p:clrMapOvr>
+</p:sld>
+</file>
+
+<file path=ppt/slides/slide6.xml><?xml version="1.0" encoding="utf-8"?>
+<p:sld xmlns:a="http://schemas.openxmlformats.org/drawingml/2006/main" xmlns:r="http://schemas.openxmlformats.org/officeDocument/2006/relationships" xmlns:p="http://schemas.openxmlformats.org/presentationml/2006/main">
+  <p:cSld>
+    <p:spTree>
+      <p:nvGrpSpPr>
+        <p:cNvPr id="1" name=""/>
+        <p:cNvGrpSpPr/>
+        <p:nvPr/>
+      </p:nvGrpSpPr>
+      <p:grpSpPr>
+        <a:xfrm>
+          <a:off x="0" y="0"/>
+          <a:ext cx="0" cy="0"/>
+          <a:chOff x="0" y="0"/>
+          <a:chExt cx="0" cy="0"/>
+        </a:xfrm>
+      </p:grpSpPr>
+      <p:sp>
+        <p:nvSpPr>
+          <p:cNvPr id="4" name="Rectangle 3"/>
+          <p:cNvSpPr/>
+          <p:nvPr/>
+        </p:nvSpPr>
+        <p:spPr>
+          <a:xfrm>
+            <a:off x="2570343" y="6483407"/>
+            <a:ext cx="4572000" cy="215444"/>
+          </a:xfrm>
+          <a:prstGeom prst="rect">
+            <a:avLst/>
+          </a:prstGeom>
+        </p:spPr>
+        <p:txBody>
+          <a:bodyPr>
+            <a:spAutoFit/>
+          </a:bodyPr>
+          <a:lstStyle/>
+          <a:p>
+            <a:r>
+              <a:rPr lang="en-US" sz="800" dirty="0"/>
+              <a:t>http://</a:t>
+            </a:r>
+            <a:r>
+              <a:rPr lang="en-US" sz="800" dirty="0" err="1"/>
+              <a:t>brunalab.org</a:t>
+            </a:r>
+            <a:r>
+              <a:rPr lang="en-US" sz="800" dirty="0"/>
+              <a:t>/blog/2014/09/04/the-opportunity-cost-of-my-openscience-was-35-hours-690/</a:t>
+            </a:r>
+          </a:p>
+        </p:txBody>
+      </p:sp>
+      <p:pic>
+        <p:nvPicPr>
+          <p:cNvPr id="7" name="Picture 6" descr="Screen Shot 2015-01-06 at 2.16.29 PM.png"/>
+          <p:cNvPicPr>
+            <a:picLocks noChangeAspect="1"/>
+          </p:cNvPicPr>
+          <p:nvPr/>
+        </p:nvPicPr>
+        <p:blipFill>
+          <a:blip r:embed="rId3">
+            <a:extLst>
+              <a:ext uri="{28A0092B-C50C-407E-A947-70E740481C1C}">
+                <a14:useLocalDpi xmlns:a14="http://schemas.microsoft.com/office/drawing/2010/main" val="0"/>
+              </a:ext>
+            </a:extLst>
+          </a:blip>
+          <a:stretch>
+            <a:fillRect/>
+          </a:stretch>
+        </p:blipFill>
+        <p:spPr>
+          <a:xfrm>
+            <a:off x="4082611" y="1772253"/>
+            <a:ext cx="4774795" cy="3391620"/>
+          </a:xfrm>
+          <a:prstGeom prst="rect">
+            <a:avLst/>
+          </a:prstGeom>
+        </p:spPr>
+      </p:pic>
+      <p:pic>
+        <p:nvPicPr>
+          <p:cNvPr id="8" name="Picture 7" descr="Screen Shot 2015-01-06 at 2.16.44 PM.png"/>
+          <p:cNvPicPr>
+            <a:picLocks noChangeAspect="1"/>
+          </p:cNvPicPr>
+          <p:nvPr/>
+        </p:nvPicPr>
+        <p:blipFill>
+          <a:blip r:embed="rId4">
+            <a:extLst>
+              <a:ext uri="{28A0092B-C50C-407E-A947-70E740481C1C}">
+                <a14:useLocalDpi xmlns:a14="http://schemas.microsoft.com/office/drawing/2010/main" val="0"/>
+              </a:ext>
+            </a:extLst>
+          </a:blip>
+          <a:stretch>
+            <a:fillRect/>
+          </a:stretch>
+        </p:blipFill>
+        <p:spPr>
+          <a:xfrm>
+            <a:off x="350690" y="557093"/>
+            <a:ext cx="8506716" cy="495099"/>
+          </a:xfrm>
+          <a:prstGeom prst="rect">
+            <a:avLst/>
+          </a:prstGeom>
+        </p:spPr>
+      </p:pic>
+      <p:sp>
+        <p:nvSpPr>
+          <p:cNvPr id="10" name="TextBox 9"/>
+          <p:cNvSpPr txBox="1"/>
+          <p:nvPr/>
+        </p:nvSpPr>
+        <p:spPr>
+          <a:xfrm>
+            <a:off x="464427" y="1980752"/>
+            <a:ext cx="3775393" cy="3693319"/>
+          </a:xfrm>
+          <a:prstGeom prst="rect">
+            <a:avLst/>
+          </a:prstGeom>
+          <a:noFill/>
+        </p:spPr>
+        <p:txBody>
+          <a:bodyPr wrap="none" rtlCol="0">
+            <a:spAutoFit/>
+          </a:bodyPr>
+          <a:lstStyle/>
+          <a:p>
+            <a:r>
+              <a:rPr lang="en-US" dirty="0" smtClean="0"/>
+              <a:t>Includes time to: </a:t>
+            </a:r>
+          </a:p>
+          <a:p>
+            <a:endParaRPr lang="en-US" dirty="0"/>
+          </a:p>
+          <a:p>
+            <a:pPr marL="285750" indent="-285750">
+              <a:buFontTx/>
+              <a:buChar char="-"/>
+            </a:pPr>
+            <a:r>
+              <a:rPr lang="en-US" dirty="0" smtClean="0"/>
+              <a:t>Create metadata</a:t>
+            </a:r>
+          </a:p>
+          <a:p>
+            <a:pPr marL="285750" indent="-285750">
+              <a:buFontTx/>
+              <a:buChar char="-"/>
+            </a:pPr>
+            <a:r>
+              <a:rPr lang="en-US" dirty="0" smtClean="0"/>
+              <a:t>Reformat, clean data</a:t>
+            </a:r>
+          </a:p>
+          <a:p>
+            <a:pPr marL="285750" indent="-285750">
+              <a:buFontTx/>
+              <a:buChar char="-"/>
+            </a:pPr>
+            <a:r>
+              <a:rPr lang="en-US" dirty="0"/>
+              <a:t>Archive data</a:t>
+            </a:r>
+          </a:p>
+          <a:p>
+            <a:pPr marL="285750" indent="-285750">
+              <a:buFontTx/>
+              <a:buChar char="-"/>
+            </a:pPr>
+            <a:r>
+              <a:rPr lang="en-US" dirty="0" smtClean="0"/>
+              <a:t>Clean, comment, and refactor code</a:t>
+            </a:r>
+          </a:p>
+          <a:p>
+            <a:pPr marL="285750" indent="-285750">
+              <a:buFontTx/>
+              <a:buChar char="-"/>
+            </a:pPr>
+            <a:r>
+              <a:rPr lang="en-US" dirty="0" smtClean="0"/>
+              <a:t>Create code repository + archive</a:t>
+            </a:r>
+          </a:p>
+          <a:p>
+            <a:pPr marL="285750" indent="-285750">
+              <a:buFontTx/>
+              <a:buChar char="-"/>
+            </a:pPr>
+            <a:endParaRPr lang="en-US" dirty="0"/>
+          </a:p>
+          <a:p>
+            <a:r>
+              <a:rPr lang="en-US" dirty="0" smtClean="0"/>
+              <a:t>That is a large amount of time from</a:t>
+            </a:r>
+          </a:p>
+          <a:p>
+            <a:r>
+              <a:rPr lang="en-US" dirty="0" smtClean="0"/>
+              <a:t>a public employee whose salary is </a:t>
+            </a:r>
+          </a:p>
+          <a:p>
+            <a:r>
+              <a:rPr lang="en-US" dirty="0" smtClean="0"/>
+              <a:t>high and expertise unrivaled… </a:t>
+            </a:r>
+          </a:p>
+          <a:p>
+            <a:pPr marL="285750" indent="-285750">
+              <a:buFontTx/>
+              <a:buChar char="-"/>
+            </a:pPr>
+            <a:endParaRPr lang="en-US" dirty="0" smtClean="0"/>
+          </a:p>
+          <a:p>
+            <a:pPr marL="285750" indent="-285750">
+              <a:buFontTx/>
+              <a:buChar char="-"/>
+            </a:pPr>
+            <a:endParaRPr lang="en-US" dirty="0" smtClean="0"/>
+          </a:p>
+        </p:txBody>
+      </p:sp>
+    </p:spTree>
+    <p:extLst>
+      <p:ext uri="{BB962C8B-B14F-4D97-AF65-F5344CB8AC3E}">
+        <p14:creationId xmlns:p14="http://schemas.microsoft.com/office/powerpoint/2010/main" val="4151286369"/>
+      </p:ext>
+    </p:extLst>
+  </p:cSld>
+  <p:clrMapOvr>
+    <a:masterClrMapping/>
+  </p:clrMapOvr>
+</p:sld>
+</file>
+
+<file path=ppt/slides/slide7.xml><?xml version="1.0" encoding="utf-8"?>
+<p:sld xmlns:a="http://schemas.openxmlformats.org/drawingml/2006/main" xmlns:r="http://schemas.openxmlformats.org/officeDocument/2006/relationships" xmlns:p="http://schemas.openxmlformats.org/presentationml/2006/main">
+  <p:cSld>
+    <p:spTree>
+      <p:nvGrpSpPr>
+        <p:cNvPr id="1" name=""/>
+        <p:cNvGrpSpPr/>
+        <p:nvPr/>
+      </p:nvGrpSpPr>
+      <p:grpSpPr>
+        <a:xfrm>
+          <a:off x="0" y="0"/>
+          <a:ext cx="0" cy="0"/>
+          <a:chOff x="0" y="0"/>
+          <a:chExt cx="0" cy="0"/>
+        </a:xfrm>
+      </p:grpSpPr>
+      <p:sp>
+        <p:nvSpPr>
+          <p:cNvPr id="2" name="Title 1"/>
+          <p:cNvSpPr>
+            <a:spLocks noGrp="1"/>
+          </p:cNvSpPr>
+          <p:nvPr>
+            <p:ph type="title"/>
+          </p:nvPr>
+        </p:nvSpPr>
+        <p:spPr/>
+        <p:txBody>
+          <a:bodyPr/>
+          <a:lstStyle/>
+          <a:p>
+            <a:r>
+              <a:rPr lang="en-US" dirty="0" smtClean="0"/>
+              <a:t>Crisis? What Crisis? </a:t>
+            </a:r>
+            <a:endParaRPr lang="en-US" dirty="0"/>
+          </a:p>
+        </p:txBody>
+      </p:sp>
+      <p:sp>
+        <p:nvSpPr>
+          <p:cNvPr id="3" name="Content Placeholder 2"/>
+          <p:cNvSpPr>
+            <a:spLocks noGrp="1"/>
+          </p:cNvSpPr>
+          <p:nvPr>
+            <p:ph idx="1"/>
+          </p:nvPr>
+        </p:nvSpPr>
+        <p:spPr/>
+        <p:txBody>
+          <a:bodyPr/>
+          <a:lstStyle/>
+          <a:p>
+            <a:endParaRPr lang="en-US" dirty="0"/>
+          </a:p>
+        </p:txBody>
+      </p:sp>
+    </p:spTree>
+    <p:extLst>
+      <p:ext uri="{BB962C8B-B14F-4D97-AF65-F5344CB8AC3E}">
+        <p14:creationId xmlns:p14="http://schemas.microsoft.com/office/powerpoint/2010/main" val="2467827608"/>
+      </p:ext>
+    </p:extLst>
+  </p:cSld>
+  <p:clrMapOvr>
+    <a:masterClrMapping/>
+  </p:clrMapOvr>
+</p:sld>
+</file>
+
+<file path=ppt/slides/slide8.xml><?xml version="1.0" encoding="utf-8"?>
+<p:sld xmlns:a="http://schemas.openxmlformats.org/drawingml/2006/main" xmlns:r="http://schemas.openxmlformats.org/officeDocument/2006/relationships" xmlns:p="http://schemas.openxmlformats.org/presentationml/2006/main">
+  <p:cSld>
+    <p:spTree>
+      <p:nvGrpSpPr>
+        <p:cNvPr id="1" name=""/>
+        <p:cNvGrpSpPr/>
+        <p:nvPr/>
+      </p:nvGrpSpPr>
+      <p:grpSpPr>
+        <a:xfrm>
+          <a:off x="0" y="0"/>
+          <a:ext cx="0" cy="0"/>
+          <a:chOff x="0" y="0"/>
+          <a:chExt cx="0" cy="0"/>
+        </a:xfrm>
+      </p:grpSpPr>
       <p:pic>
         <p:nvPicPr>
           <p:cNvPr id="4" name="Picture 3" descr="Screen Shot 2014-12-24 at 11.38.52 AM.png"/>
@@ -3118,8 +4515,8 @@
         </p:blipFill>
         <p:spPr>
           <a:xfrm>
-            <a:off x="-88691" y="1598641"/>
-            <a:ext cx="9284527" cy="812194"/>
+            <a:off x="521645" y="1598641"/>
+            <a:ext cx="8495768" cy="743195"/>
           </a:xfrm>
           <a:prstGeom prst="rect">
             <a:avLst/>
@@ -3148,7 +4545,7 @@
         </p:blipFill>
         <p:spPr>
           <a:xfrm>
-            <a:off x="1531671" y="2682953"/>
+            <a:off x="521803" y="2341836"/>
             <a:ext cx="2019736" cy="1891207"/>
           </a:xfrm>
           <a:prstGeom prst="rect">
@@ -3243,7 +4640,7 @@
 </p:sld>
 </file>
 
-<file path=ppt/slides/slide2.xml><?xml version="1.0" encoding="utf-8"?>
+<file path=ppt/slides/slide9.xml><?xml version="1.0" encoding="utf-8"?>
 <p:sld xmlns:a="http://schemas.openxmlformats.org/drawingml/2006/main" xmlns:r="http://schemas.openxmlformats.org/officeDocument/2006/relationships" xmlns:p="http://schemas.openxmlformats.org/presentationml/2006/main">
   <p:cSld>
     <p:spTree>
@@ -3260,24 +4657,53 @@
           <a:chExt cx="0" cy="0"/>
         </a:xfrm>
       </p:grpSpPr>
+      <p:sp>
+        <p:nvSpPr>
+          <p:cNvPr id="2" name="Title 1"/>
+          <p:cNvSpPr>
+            <a:spLocks noGrp="1"/>
+          </p:cNvSpPr>
+          <p:nvPr>
+            <p:ph type="title"/>
+          </p:nvPr>
+        </p:nvSpPr>
+        <p:spPr/>
+        <p:txBody>
+          <a:bodyPr/>
+          <a:lstStyle/>
+          <a:p>
+            <a:r>
+              <a:rPr lang="en-US" dirty="0" smtClean="0"/>
+              <a:t>Open Data</a:t>
+            </a:r>
+            <a:endParaRPr lang="en-US" dirty="0"/>
+          </a:p>
+        </p:txBody>
+      </p:sp>
       <p:pic>
         <p:nvPicPr>
-          <p:cNvPr id="4" name="Picture 3"/>
+          <p:cNvPr id="4" name="Picture 3" descr="Screen Shot 2015-01-07 at 4.18.52 PM.png"/>
           <p:cNvPicPr>
             <a:picLocks noChangeAspect="1"/>
           </p:cNvPicPr>
           <p:nvPr/>
         </p:nvPicPr>
         <p:blipFill>
-          <a:blip r:embed="rId2"/>
+          <a:blip r:embed="rId2">
+            <a:extLst>
+              <a:ext uri="{28A0092B-C50C-407E-A947-70E740481C1C}">
+                <a14:useLocalDpi xmlns:a14="http://schemas.microsoft.com/office/drawing/2010/main" val="0"/>
+              </a:ext>
+            </a:extLst>
+          </a:blip>
           <a:stretch>
             <a:fillRect/>
           </a:stretch>
         </p:blipFill>
         <p:spPr>
           <a:xfrm>
-            <a:off x="1003695" y="939824"/>
-            <a:ext cx="6604000" cy="3708400"/>
+            <a:off x="613128" y="1417638"/>
+            <a:ext cx="8248030" cy="5317092"/>
           </a:xfrm>
           <a:prstGeom prst="rect">
             <a:avLst/>
@@ -3287,7 +4713,7 @@
     </p:spTree>
     <p:extLst>
       <p:ext uri="{BB962C8B-B14F-4D97-AF65-F5344CB8AC3E}">
-        <p14:creationId xmlns:p14="http://schemas.microsoft.com/office/powerpoint/2010/main" val="2537751626"/>
+        <p14:creationId xmlns:p14="http://schemas.microsoft.com/office/powerpoint/2010/main" val="2046544117"/>
       </p:ext>
     </p:extLst>
   </p:cSld>
@@ -3615,4 +5041,324 @@
   </a:objectDefaults>
   <a:extraClrSchemeLst/>
 </a:theme>
+</file>
+
+<file path=ppt/theme/theme2.xml><?xml version="1.0" encoding="utf-8"?>
+<a:theme xmlns:a="http://schemas.openxmlformats.org/drawingml/2006/main" name="Office Theme">
+  <a:themeElements>
+    <a:clrScheme name="Office">
+      <a:dk1>
+        <a:sysClr val="windowText" lastClr="000000"/>
+      </a:dk1>
+      <a:lt1>
+        <a:sysClr val="window" lastClr="FFFFFF"/>
+      </a:lt1>
+      <a:dk2>
+        <a:srgbClr val="1F497D"/>
+      </a:dk2>
+      <a:lt2>
+        <a:srgbClr val="EEECE1"/>
+      </a:lt2>
+      <a:accent1>
+        <a:srgbClr val="4F81BD"/>
+      </a:accent1>
+      <a:accent2>
+        <a:srgbClr val="C0504D"/>
+      </a:accent2>
+      <a:accent3>
+        <a:srgbClr val="9BBB59"/>
+      </a:accent3>
+      <a:accent4>
+        <a:srgbClr val="8064A2"/>
+      </a:accent4>
+      <a:accent5>
+        <a:srgbClr val="4BACC6"/>
+      </a:accent5>
+      <a:accent6>
+        <a:srgbClr val="F79646"/>
+      </a:accent6>
+      <a:hlink>
+        <a:srgbClr val="0000FF"/>
+      </a:hlink>
+      <a:folHlink>
+        <a:srgbClr val="800080"/>
+      </a:folHlink>
+    </a:clrScheme>
+    <a:fontScheme name="Office">
+      <a:majorFont>
+        <a:latin typeface="Calibri"/>
+        <a:ea typeface=""/>
+        <a:cs typeface=""/>
+        <a:font script="Jpan" typeface="ＭＳ Ｐゴシック"/>
+        <a:font script="Hang" typeface="맑은 고딕"/>
+        <a:font script="Hans" typeface="宋体"/>
+        <a:font script="Hant" typeface="新細明體"/>
+        <a:font script="Arab" typeface="Times New Roman"/>
+        <a:font script="Hebr" typeface="Times New Roman"/>
+        <a:font script="Thai" typeface="Angsana New"/>
+        <a:font script="Ethi" typeface="Nyala"/>
+        <a:font script="Beng" typeface="Vrinda"/>
+        <a:font script="Gujr" typeface="Shruti"/>
+        <a:font script="Khmr" typeface="MoolBoran"/>
+        <a:font script="Knda" typeface="Tunga"/>
+        <a:font script="Guru" typeface="Raavi"/>
+        <a:font script="Cans" typeface="Euphemia"/>
+        <a:font script="Cher" typeface="Plantagenet Cherokee"/>
+        <a:font script="Yiii" typeface="Microsoft Yi Baiti"/>
+        <a:font script="Tibt" typeface="Microsoft Himalaya"/>
+        <a:font script="Thaa" typeface="MV Boli"/>
+        <a:font script="Deva" typeface="Mangal"/>
+        <a:font script="Telu" typeface="Gautami"/>
+        <a:font script="Taml" typeface="Latha"/>
+        <a:font script="Syrc" typeface="Estrangelo Edessa"/>
+        <a:font script="Orya" typeface="Kalinga"/>
+        <a:font script="Mlym" typeface="Kartika"/>
+        <a:font script="Laoo" typeface="DokChampa"/>
+        <a:font script="Sinh" typeface="Iskoola Pota"/>
+        <a:font script="Mong" typeface="Mongolian Baiti"/>
+        <a:font script="Viet" typeface="Times New Roman"/>
+        <a:font script="Uigh" typeface="Microsoft Uighur"/>
+        <a:font script="Geor" typeface="Sylfaen"/>
+      </a:majorFont>
+      <a:minorFont>
+        <a:latin typeface="Calibri"/>
+        <a:ea typeface=""/>
+        <a:cs typeface=""/>
+        <a:font script="Jpan" typeface="ＭＳ Ｐゴシック"/>
+        <a:font script="Hang" typeface="맑은 고딕"/>
+        <a:font script="Hans" typeface="宋体"/>
+        <a:font script="Hant" typeface="新細明體"/>
+        <a:font script="Arab" typeface="Arial"/>
+        <a:font script="Hebr" typeface="Arial"/>
+        <a:font script="Thai" typeface="Cordia New"/>
+        <a:font script="Ethi" typeface="Nyala"/>
+        <a:font script="Beng" typeface="Vrinda"/>
+        <a:font script="Gujr" typeface="Shruti"/>
+        <a:font script="Khmr" typeface="DaunPenh"/>
+        <a:font script="Knda" typeface="Tunga"/>
+        <a:font script="Guru" typeface="Raavi"/>
+        <a:font script="Cans" typeface="Euphemia"/>
+        <a:font script="Cher" typeface="Plantagenet Cherokee"/>
+        <a:font script="Yiii" typeface="Microsoft Yi Baiti"/>
+        <a:font script="Tibt" typeface="Microsoft Himalaya"/>
+        <a:font script="Thaa" typeface="MV Boli"/>
+        <a:font script="Deva" typeface="Mangal"/>
+        <a:font script="Telu" typeface="Gautami"/>
+        <a:font script="Taml" typeface="Latha"/>
+        <a:font script="Syrc" typeface="Estrangelo Edessa"/>
+        <a:font script="Orya" typeface="Kalinga"/>
+        <a:font script="Mlym" typeface="Kartika"/>
+        <a:font script="Laoo" typeface="DokChampa"/>
+        <a:font script="Sinh" typeface="Iskoola Pota"/>
+        <a:font script="Mong" typeface="Mongolian Baiti"/>
+        <a:font script="Viet" typeface="Arial"/>
+        <a:font script="Uigh" typeface="Microsoft Uighur"/>
+        <a:font script="Geor" typeface="Sylfaen"/>
+      </a:minorFont>
+    </a:fontScheme>
+    <a:fmtScheme name="Office">
+      <a:fillStyleLst>
+        <a:solidFill>
+          <a:schemeClr val="phClr"/>
+        </a:solidFill>
+        <a:gradFill rotWithShape="1">
+          <a:gsLst>
+            <a:gs pos="0">
+              <a:schemeClr val="phClr">
+                <a:tint val="50000"/>
+                <a:satMod val="300000"/>
+              </a:schemeClr>
+            </a:gs>
+            <a:gs pos="35000">
+              <a:schemeClr val="phClr">
+                <a:tint val="37000"/>
+                <a:satMod val="300000"/>
+              </a:schemeClr>
+            </a:gs>
+            <a:gs pos="100000">
+              <a:schemeClr val="phClr">
+                <a:tint val="15000"/>
+                <a:satMod val="350000"/>
+              </a:schemeClr>
+            </a:gs>
+          </a:gsLst>
+          <a:lin ang="16200000" scaled="1"/>
+        </a:gradFill>
+        <a:gradFill rotWithShape="1">
+          <a:gsLst>
+            <a:gs pos="0">
+              <a:schemeClr val="phClr">
+                <a:tint val="100000"/>
+                <a:shade val="100000"/>
+                <a:satMod val="130000"/>
+              </a:schemeClr>
+            </a:gs>
+            <a:gs pos="100000">
+              <a:schemeClr val="phClr">
+                <a:tint val="50000"/>
+                <a:shade val="100000"/>
+                <a:satMod val="350000"/>
+              </a:schemeClr>
+            </a:gs>
+          </a:gsLst>
+          <a:lin ang="16200000" scaled="0"/>
+        </a:gradFill>
+      </a:fillStyleLst>
+      <a:lnStyleLst>
+        <a:ln w="9525" cap="flat" cmpd="sng" algn="ctr">
+          <a:solidFill>
+            <a:schemeClr val="phClr">
+              <a:shade val="95000"/>
+              <a:satMod val="105000"/>
+            </a:schemeClr>
+          </a:solidFill>
+          <a:prstDash val="solid"/>
+        </a:ln>
+        <a:ln w="25400" cap="flat" cmpd="sng" algn="ctr">
+          <a:solidFill>
+            <a:schemeClr val="phClr"/>
+          </a:solidFill>
+          <a:prstDash val="solid"/>
+        </a:ln>
+        <a:ln w="38100" cap="flat" cmpd="sng" algn="ctr">
+          <a:solidFill>
+            <a:schemeClr val="phClr"/>
+          </a:solidFill>
+          <a:prstDash val="solid"/>
+        </a:ln>
+      </a:lnStyleLst>
+      <a:effectStyleLst>
+        <a:effectStyle>
+          <a:effectLst>
+            <a:outerShdw blurRad="40000" dist="20000" dir="5400000" rotWithShape="0">
+              <a:srgbClr val="000000">
+                <a:alpha val="38000"/>
+              </a:srgbClr>
+            </a:outerShdw>
+          </a:effectLst>
+        </a:effectStyle>
+        <a:effectStyle>
+          <a:effectLst>
+            <a:outerShdw blurRad="40000" dist="23000" dir="5400000" rotWithShape="0">
+              <a:srgbClr val="000000">
+                <a:alpha val="35000"/>
+              </a:srgbClr>
+            </a:outerShdw>
+          </a:effectLst>
+        </a:effectStyle>
+        <a:effectStyle>
+          <a:effectLst>
+            <a:outerShdw blurRad="40000" dist="23000" dir="5400000" rotWithShape="0">
+              <a:srgbClr val="000000">
+                <a:alpha val="35000"/>
+              </a:srgbClr>
+            </a:outerShdw>
+          </a:effectLst>
+          <a:scene3d>
+            <a:camera prst="orthographicFront">
+              <a:rot lat="0" lon="0" rev="0"/>
+            </a:camera>
+            <a:lightRig rig="threePt" dir="t">
+              <a:rot lat="0" lon="0" rev="1200000"/>
+            </a:lightRig>
+          </a:scene3d>
+          <a:sp3d>
+            <a:bevelT w="63500" h="25400"/>
+          </a:sp3d>
+        </a:effectStyle>
+      </a:effectStyleLst>
+      <a:bgFillStyleLst>
+        <a:solidFill>
+          <a:schemeClr val="phClr"/>
+        </a:solidFill>
+        <a:gradFill rotWithShape="1">
+          <a:gsLst>
+            <a:gs pos="0">
+              <a:schemeClr val="phClr">
+                <a:tint val="40000"/>
+                <a:satMod val="350000"/>
+              </a:schemeClr>
+            </a:gs>
+            <a:gs pos="40000">
+              <a:schemeClr val="phClr">
+                <a:tint val="45000"/>
+                <a:shade val="99000"/>
+                <a:satMod val="350000"/>
+              </a:schemeClr>
+            </a:gs>
+            <a:gs pos="100000">
+              <a:schemeClr val="phClr">
+                <a:shade val="20000"/>
+                <a:satMod val="255000"/>
+              </a:schemeClr>
+            </a:gs>
+          </a:gsLst>
+          <a:path path="circle">
+            <a:fillToRect l="50000" t="-80000" r="50000" b="180000"/>
+          </a:path>
+        </a:gradFill>
+        <a:gradFill rotWithShape="1">
+          <a:gsLst>
+            <a:gs pos="0">
+              <a:schemeClr val="phClr">
+                <a:tint val="80000"/>
+                <a:satMod val="300000"/>
+              </a:schemeClr>
+            </a:gs>
+            <a:gs pos="100000">
+              <a:schemeClr val="phClr">
+                <a:shade val="30000"/>
+                <a:satMod val="200000"/>
+              </a:schemeClr>
+            </a:gs>
+          </a:gsLst>
+          <a:path path="circle">
+            <a:fillToRect l="50000" t="50000" r="50000" b="50000"/>
+          </a:path>
+        </a:gradFill>
+      </a:bgFillStyleLst>
+    </a:fmtScheme>
+  </a:themeElements>
+  <a:objectDefaults>
+    <a:spDef>
+      <a:spPr/>
+      <a:bodyPr/>
+      <a:lstStyle/>
+      <a:style>
+        <a:lnRef idx="1">
+          <a:schemeClr val="accent1"/>
+        </a:lnRef>
+        <a:fillRef idx="3">
+          <a:schemeClr val="accent1"/>
+        </a:fillRef>
+        <a:effectRef idx="2">
+          <a:schemeClr val="accent1"/>
+        </a:effectRef>
+        <a:fontRef idx="minor">
+          <a:schemeClr val="lt1"/>
+        </a:fontRef>
+      </a:style>
+    </a:spDef>
+    <a:lnDef>
+      <a:spPr/>
+      <a:bodyPr/>
+      <a:lstStyle/>
+      <a:style>
+        <a:lnRef idx="2">
+          <a:schemeClr val="accent1"/>
+        </a:lnRef>
+        <a:fillRef idx="0">
+          <a:schemeClr val="accent1"/>
+        </a:fillRef>
+        <a:effectRef idx="1">
+          <a:schemeClr val="accent1"/>
+        </a:effectRef>
+        <a:fontRef idx="minor">
+          <a:schemeClr val="tx1"/>
+        </a:fontRef>
+      </a:style>
+    </a:lnDef>
+  </a:objectDefaults>
+  <a:extraClrSchemeLst/>
+</a:theme>
 </file>
</xml_diff>

<commit_message>
push changes from 01-25
</commit_message>
<xml_diff>
--- a/Day_1/Plenary/Day_1_Plenary_OpenData.pptx
+++ b/Day_1/Plenary/Day_1_Plenary_OpenData.pptx
@@ -5,27 +5,28 @@
     <p:sldMasterId id="2147483648" r:id="rId1"/>
   </p:sldMasterIdLst>
   <p:notesMasterIdLst>
-    <p:notesMasterId r:id="rId20"/>
+    <p:notesMasterId r:id="rId21"/>
   </p:notesMasterIdLst>
   <p:sldIdLst>
     <p:sldId id="258" r:id="rId2"/>
-    <p:sldId id="273" r:id="rId3"/>
-    <p:sldId id="268" r:id="rId4"/>
-    <p:sldId id="269" r:id="rId5"/>
-    <p:sldId id="270" r:id="rId6"/>
-    <p:sldId id="271" r:id="rId7"/>
-    <p:sldId id="272" r:id="rId8"/>
-    <p:sldId id="257" r:id="rId9"/>
-    <p:sldId id="259" r:id="rId10"/>
-    <p:sldId id="260" r:id="rId11"/>
-    <p:sldId id="262" r:id="rId12"/>
-    <p:sldId id="261" r:id="rId13"/>
-    <p:sldId id="267" r:id="rId14"/>
-    <p:sldId id="263" r:id="rId15"/>
-    <p:sldId id="256" r:id="rId16"/>
-    <p:sldId id="264" r:id="rId17"/>
-    <p:sldId id="266" r:id="rId18"/>
-    <p:sldId id="274" r:id="rId19"/>
+    <p:sldId id="275" r:id="rId3"/>
+    <p:sldId id="273" r:id="rId4"/>
+    <p:sldId id="268" r:id="rId5"/>
+    <p:sldId id="269" r:id="rId6"/>
+    <p:sldId id="270" r:id="rId7"/>
+    <p:sldId id="271" r:id="rId8"/>
+    <p:sldId id="272" r:id="rId9"/>
+    <p:sldId id="257" r:id="rId10"/>
+    <p:sldId id="259" r:id="rId11"/>
+    <p:sldId id="260" r:id="rId12"/>
+    <p:sldId id="262" r:id="rId13"/>
+    <p:sldId id="261" r:id="rId14"/>
+    <p:sldId id="267" r:id="rId15"/>
+    <p:sldId id="263" r:id="rId16"/>
+    <p:sldId id="256" r:id="rId17"/>
+    <p:sldId id="264" r:id="rId18"/>
+    <p:sldId id="266" r:id="rId19"/>
+    <p:sldId id="274" r:id="rId20"/>
   </p:sldIdLst>
   <p:sldSz cx="9144000" cy="6858000" type="screen4x3"/>
   <p:notesSz cx="6858000" cy="9144000"/>
@@ -209,7 +210,7 @@
           <a:p>
             <a:fld id="{27377218-730A-A747-A2EA-360839892EA2}" type="datetimeFigureOut">
               <a:rPr lang="en-US" smtClean="0"/>
-              <a:t>1/19/15</a:t>
+              <a:t>1/25/15</a:t>
             </a:fld>
             <a:endParaRPr lang="en-US"/>
           </a:p>
@@ -560,7 +561,7 @@
           <a:p>
             <a:fld id="{E7BCF3C9-BCDD-8D45-9AD8-23E648023F32}" type="slidenum">
               <a:rPr lang="en-US" smtClean="0"/>
-              <a:t>12</a:t>
+              <a:t>13</a:t>
             </a:fld>
             <a:endParaRPr lang="en-US"/>
           </a:p>
@@ -664,7 +665,7 @@
           <a:p>
             <a:fld id="{E7BCF3C9-BCDD-8D45-9AD8-23E648023F32}" type="slidenum">
               <a:rPr lang="en-US" smtClean="0"/>
-              <a:t>13</a:t>
+              <a:t>14</a:t>
             </a:fld>
             <a:endParaRPr lang="en-US"/>
           </a:p>
@@ -864,7 +865,7 @@
           <a:p>
             <a:fld id="{89ACF3DB-EC51-3840-900F-470751CD5404}" type="datetimeFigureOut">
               <a:rPr lang="en-US" smtClean="0"/>
-              <a:t>1/19/15</a:t>
+              <a:t>1/25/15</a:t>
             </a:fld>
             <a:endParaRPr lang="en-US"/>
           </a:p>
@@ -1034,7 +1035,7 @@
           <a:p>
             <a:fld id="{89ACF3DB-EC51-3840-900F-470751CD5404}" type="datetimeFigureOut">
               <a:rPr lang="en-US" smtClean="0"/>
-              <a:t>1/19/15</a:t>
+              <a:t>1/25/15</a:t>
             </a:fld>
             <a:endParaRPr lang="en-US"/>
           </a:p>
@@ -1214,7 +1215,7 @@
           <a:p>
             <a:fld id="{89ACF3DB-EC51-3840-900F-470751CD5404}" type="datetimeFigureOut">
               <a:rPr lang="en-US" smtClean="0"/>
-              <a:t>1/19/15</a:t>
+              <a:t>1/25/15</a:t>
             </a:fld>
             <a:endParaRPr lang="en-US"/>
           </a:p>
@@ -1384,7 +1385,7 @@
           <a:p>
             <a:fld id="{89ACF3DB-EC51-3840-900F-470751CD5404}" type="datetimeFigureOut">
               <a:rPr lang="en-US" smtClean="0"/>
-              <a:t>1/19/15</a:t>
+              <a:t>1/25/15</a:t>
             </a:fld>
             <a:endParaRPr lang="en-US"/>
           </a:p>
@@ -1630,7 +1631,7 @@
           <a:p>
             <a:fld id="{89ACF3DB-EC51-3840-900F-470751CD5404}" type="datetimeFigureOut">
               <a:rPr lang="en-US" smtClean="0"/>
-              <a:t>1/19/15</a:t>
+              <a:t>1/25/15</a:t>
             </a:fld>
             <a:endParaRPr lang="en-US"/>
           </a:p>
@@ -1918,7 +1919,7 @@
           <a:p>
             <a:fld id="{89ACF3DB-EC51-3840-900F-470751CD5404}" type="datetimeFigureOut">
               <a:rPr lang="en-US" smtClean="0"/>
-              <a:t>1/19/15</a:t>
+              <a:t>1/25/15</a:t>
             </a:fld>
             <a:endParaRPr lang="en-US"/>
           </a:p>
@@ -2340,7 +2341,7 @@
           <a:p>
             <a:fld id="{89ACF3DB-EC51-3840-900F-470751CD5404}" type="datetimeFigureOut">
               <a:rPr lang="en-US" smtClean="0"/>
-              <a:t>1/19/15</a:t>
+              <a:t>1/25/15</a:t>
             </a:fld>
             <a:endParaRPr lang="en-US"/>
           </a:p>
@@ -2458,7 +2459,7 @@
           <a:p>
             <a:fld id="{89ACF3DB-EC51-3840-900F-470751CD5404}" type="datetimeFigureOut">
               <a:rPr lang="en-US" smtClean="0"/>
-              <a:t>1/19/15</a:t>
+              <a:t>1/25/15</a:t>
             </a:fld>
             <a:endParaRPr lang="en-US"/>
           </a:p>
@@ -2553,7 +2554,7 @@
           <a:p>
             <a:fld id="{89ACF3DB-EC51-3840-900F-470751CD5404}" type="datetimeFigureOut">
               <a:rPr lang="en-US" smtClean="0"/>
-              <a:t>1/19/15</a:t>
+              <a:t>1/25/15</a:t>
             </a:fld>
             <a:endParaRPr lang="en-US"/>
           </a:p>
@@ -2830,7 +2831,7 @@
           <a:p>
             <a:fld id="{89ACF3DB-EC51-3840-900F-470751CD5404}" type="datetimeFigureOut">
               <a:rPr lang="en-US" smtClean="0"/>
-              <a:t>1/19/15</a:t>
+              <a:t>1/25/15</a:t>
             </a:fld>
             <a:endParaRPr lang="en-US"/>
           </a:p>
@@ -3083,7 +3084,7 @@
           <a:p>
             <a:fld id="{89ACF3DB-EC51-3840-900F-470751CD5404}" type="datetimeFigureOut">
               <a:rPr lang="en-US" smtClean="0"/>
-              <a:t>1/19/15</a:t>
+              <a:t>1/25/15</a:t>
             </a:fld>
             <a:endParaRPr lang="en-US"/>
           </a:p>
@@ -3296,7 +3297,7 @@
           <a:p>
             <a:fld id="{89ACF3DB-EC51-3840-900F-470751CD5404}" type="datetimeFigureOut">
               <a:rPr lang="en-US" smtClean="0"/>
-              <a:t>1/19/15</a:t>
+              <a:t>1/25/15</a:t>
             </a:fld>
             <a:endParaRPr lang="en-US"/>
           </a:p>
@@ -3810,7 +3811,7 @@
         </p:nvSpPr>
         <p:spPr>
           <a:xfrm>
-            <a:off x="457200" y="3117824"/>
+            <a:off x="352941" y="274638"/>
             <a:ext cx="8229600" cy="1143000"/>
           </a:xfrm>
         </p:spPr>
@@ -3819,8 +3820,126 @@
           <a:lstStyle/>
           <a:p>
             <a:r>
+              <a:rPr lang="en-US" dirty="0" smtClean="0">
+                <a:solidFill>
+                  <a:schemeClr val="bg1">
+                    <a:lumMod val="65000"/>
+                  </a:schemeClr>
+                </a:solidFill>
+              </a:rPr>
+              <a:t>Agenda</a:t>
+            </a:r>
+            <a:endParaRPr lang="en-US" dirty="0">
+              <a:solidFill>
+                <a:schemeClr val="bg1">
+                  <a:lumMod val="65000"/>
+                </a:schemeClr>
+              </a:solidFill>
+            </a:endParaRPr>
+          </a:p>
+        </p:txBody>
+      </p:sp>
+      <p:sp>
+        <p:nvSpPr>
+          <p:cNvPr id="3" name="Content Placeholder 2"/>
+          <p:cNvSpPr>
+            <a:spLocks noGrp="1"/>
+          </p:cNvSpPr>
+          <p:nvPr>
+            <p:ph idx="1"/>
+          </p:nvPr>
+        </p:nvSpPr>
+        <p:spPr/>
+        <p:txBody>
+          <a:bodyPr>
+            <a:normAutofit lnSpcReduction="10000"/>
+          </a:bodyPr>
+          <a:lstStyle/>
+          <a:p>
+            <a:pPr marL="0" indent="0">
+              <a:buNone/>
+            </a:pPr>
+            <a:r>
+              <a:rPr lang="en-US" b="1" dirty="0" smtClean="0"/>
+              <a:t>The Context of Research Data Curation</a:t>
+            </a:r>
+          </a:p>
+          <a:p>
+            <a:pPr lvl="1">
+              <a:buFontTx/>
+              <a:buChar char="-"/>
+            </a:pPr>
+            <a:r>
               <a:rPr lang="en-US" dirty="0" smtClean="0"/>
-              <a:t>2 Quick Examples</a:t>
+              <a:t>Economic Investment in Public Goods</a:t>
+            </a:r>
+          </a:p>
+          <a:p>
+            <a:pPr lvl="1">
+              <a:buFontTx/>
+              <a:buChar char="-"/>
+            </a:pPr>
+            <a:r>
+              <a:rPr lang="en-US" dirty="0" smtClean="0"/>
+              <a:t>Reproducibility of New Knowledge</a:t>
+            </a:r>
+          </a:p>
+          <a:p>
+            <a:pPr marL="0" indent="0">
+              <a:buNone/>
+            </a:pPr>
+            <a:r>
+              <a:rPr lang="en-US" b="1" dirty="0" smtClean="0"/>
+              <a:t>Open Data</a:t>
+            </a:r>
+          </a:p>
+          <a:p>
+            <a:pPr lvl="1">
+              <a:buFontTx/>
+              <a:buChar char="-"/>
+            </a:pPr>
+            <a:r>
+              <a:rPr lang="en-US" dirty="0" smtClean="0"/>
+              <a:t>Government + Commercial Sector</a:t>
+            </a:r>
+          </a:p>
+          <a:p>
+            <a:pPr lvl="1">
+              <a:buFontTx/>
+              <a:buChar char="-"/>
+            </a:pPr>
+            <a:r>
+              <a:rPr lang="en-US" dirty="0" smtClean="0"/>
+              <a:t>Research + Higher Education</a:t>
+            </a:r>
+          </a:p>
+          <a:p>
+            <a:pPr marL="0" indent="0">
+              <a:buNone/>
+            </a:pPr>
+            <a:r>
+              <a:rPr lang="en-US" b="1" dirty="0" smtClean="0"/>
+              <a:t>Scholarly Communications</a:t>
+            </a:r>
+          </a:p>
+          <a:p>
+            <a:pPr lvl="1">
+              <a:buFontTx/>
+              <a:buChar char="-"/>
+            </a:pPr>
+            <a:r>
+              <a:rPr lang="en-US" dirty="0" smtClean="0"/>
+              <a:t>Decoupling the scholarly record</a:t>
+            </a:r>
+          </a:p>
+          <a:p>
+            <a:pPr lvl="1">
+              <a:buFontTx/>
+              <a:buChar char="-"/>
+            </a:pPr>
+            <a:r>
+              <a:rPr lang="en-US" dirty="0" smtClean="0"/>
+              <a:t>Research Objects as first-class scholarly products  </a:t>
             </a:r>
             <a:endParaRPr lang="en-US" dirty="0"/>
           </a:p>
@@ -3829,7 +3948,7 @@
     </p:spTree>
     <p:extLst>
       <p:ext uri="{BB962C8B-B14F-4D97-AF65-F5344CB8AC3E}">
-        <p14:creationId xmlns:p14="http://schemas.microsoft.com/office/powerpoint/2010/main" val="2668410991"/>
+        <p14:creationId xmlns:p14="http://schemas.microsoft.com/office/powerpoint/2010/main" val="1970159385"/>
       </p:ext>
     </p:extLst>
   </p:cSld>
@@ -3873,6 +3992,64 @@
           </a:xfrm>
         </p:spPr>
         <p:txBody>
+          <a:bodyPr/>
+          <a:lstStyle/>
+          <a:p>
+            <a:r>
+              <a:rPr lang="en-US" dirty="0" smtClean="0"/>
+              <a:t>2 Quick Examples</a:t>
+            </a:r>
+            <a:endParaRPr lang="en-US" dirty="0"/>
+          </a:p>
+        </p:txBody>
+      </p:sp>
+    </p:spTree>
+    <p:extLst>
+      <p:ext uri="{BB962C8B-B14F-4D97-AF65-F5344CB8AC3E}">
+        <p14:creationId xmlns:p14="http://schemas.microsoft.com/office/powerpoint/2010/main" val="2668410991"/>
+      </p:ext>
+    </p:extLst>
+  </p:cSld>
+  <p:clrMapOvr>
+    <a:masterClrMapping/>
+  </p:clrMapOvr>
+</p:sld>
+</file>
+
+<file path=ppt/slides/slide12.xml><?xml version="1.0" encoding="utf-8"?>
+<p:sld xmlns:a="http://schemas.openxmlformats.org/drawingml/2006/main" xmlns:r="http://schemas.openxmlformats.org/officeDocument/2006/relationships" xmlns:p="http://schemas.openxmlformats.org/presentationml/2006/main">
+  <p:cSld>
+    <p:spTree>
+      <p:nvGrpSpPr>
+        <p:cNvPr id="1" name=""/>
+        <p:cNvGrpSpPr/>
+        <p:nvPr/>
+      </p:nvGrpSpPr>
+      <p:grpSpPr>
+        <a:xfrm>
+          <a:off x="0" y="0"/>
+          <a:ext cx="0" cy="0"/>
+          <a:chOff x="0" y="0"/>
+          <a:chExt cx="0" cy="0"/>
+        </a:xfrm>
+      </p:grpSpPr>
+      <p:sp>
+        <p:nvSpPr>
+          <p:cNvPr id="2" name="Title 1"/>
+          <p:cNvSpPr>
+            <a:spLocks noGrp="1"/>
+          </p:cNvSpPr>
+          <p:nvPr>
+            <p:ph type="title"/>
+          </p:nvPr>
+        </p:nvSpPr>
+        <p:spPr>
+          <a:xfrm>
+            <a:off x="457200" y="3117824"/>
+            <a:ext cx="8229600" cy="1143000"/>
+          </a:xfrm>
+        </p:spPr>
+        <p:txBody>
           <a:bodyPr>
             <a:normAutofit fontScale="90000"/>
           </a:bodyPr>
@@ -3907,7 +4084,7 @@
 </p:sld>
 </file>
 
-<file path=ppt/slides/slide12.xml><?xml version="1.0" encoding="utf-8"?>
+<file path=ppt/slides/slide13.xml><?xml version="1.0" encoding="utf-8"?>
 <p:sld xmlns:a="http://schemas.openxmlformats.org/drawingml/2006/main" xmlns:r="http://schemas.openxmlformats.org/officeDocument/2006/relationships" xmlns:p="http://schemas.openxmlformats.org/presentationml/2006/main">
   <p:cSld>
     <p:spTree>
@@ -4154,96 +4331,6 @@
 </p:sld>
 </file>
 
-<file path=ppt/slides/slide13.xml><?xml version="1.0" encoding="utf-8"?>
-<p:sld xmlns:a="http://schemas.openxmlformats.org/drawingml/2006/main" xmlns:r="http://schemas.openxmlformats.org/officeDocument/2006/relationships" xmlns:p="http://schemas.openxmlformats.org/presentationml/2006/main">
-  <p:cSld>
-    <p:spTree>
-      <p:nvGrpSpPr>
-        <p:cNvPr id="1" name=""/>
-        <p:cNvGrpSpPr/>
-        <p:nvPr/>
-      </p:nvGrpSpPr>
-      <p:grpSpPr>
-        <a:xfrm>
-          <a:off x="0" y="0"/>
-          <a:ext cx="0" cy="0"/>
-          <a:chOff x="0" y="0"/>
-          <a:chExt cx="0" cy="0"/>
-        </a:xfrm>
-      </p:grpSpPr>
-      <p:sp>
-        <p:nvSpPr>
-          <p:cNvPr id="2" name="Title 1"/>
-          <p:cNvSpPr>
-            <a:spLocks noGrp="1"/>
-          </p:cNvSpPr>
-          <p:nvPr>
-            <p:ph type="title"/>
-          </p:nvPr>
-        </p:nvSpPr>
-        <p:spPr/>
-        <p:txBody>
-          <a:bodyPr/>
-          <a:lstStyle/>
-          <a:p>
-            <a:endParaRPr lang="en-US"/>
-          </a:p>
-        </p:txBody>
-      </p:sp>
-      <p:sp>
-        <p:nvSpPr>
-          <p:cNvPr id="3" name="Content Placeholder 2"/>
-          <p:cNvSpPr>
-            <a:spLocks noGrp="1"/>
-          </p:cNvSpPr>
-          <p:nvPr>
-            <p:ph idx="1"/>
-          </p:nvPr>
-        </p:nvSpPr>
-        <p:spPr/>
-        <p:txBody>
-          <a:bodyPr/>
-          <a:lstStyle/>
-          <a:p>
-            <a:pPr marL="0" indent="0">
-              <a:buNone/>
-            </a:pPr>
-            <a:r>
-              <a:rPr lang="en-US" dirty="0" smtClean="0"/>
-              <a:t>Cost including salary: $2948 </a:t>
-            </a:r>
-          </a:p>
-          <a:p>
-            <a:pPr marL="0" indent="0">
-              <a:buNone/>
-            </a:pPr>
-            <a:endParaRPr lang="en-US" dirty="0"/>
-          </a:p>
-          <a:p>
-            <a:pPr marL="0" indent="0">
-              <a:buNone/>
-            </a:pPr>
-            <a:r>
-              <a:rPr lang="en-US" dirty="0" smtClean="0"/>
-              <a:t>Opportunity cost… enormous. </a:t>
-            </a:r>
-            <a:endParaRPr lang="en-US" dirty="0"/>
-          </a:p>
-        </p:txBody>
-      </p:sp>
-    </p:spTree>
-    <p:extLst>
-      <p:ext uri="{BB962C8B-B14F-4D97-AF65-F5344CB8AC3E}">
-        <p14:creationId xmlns:p14="http://schemas.microsoft.com/office/powerpoint/2010/main" val="700443825"/>
-      </p:ext>
-    </p:extLst>
-  </p:cSld>
-  <p:clrMapOvr>
-    <a:masterClrMapping/>
-  </p:clrMapOvr>
-</p:sld>
-</file>
-
 <file path=ppt/slides/slide14.xml><?xml version="1.0" encoding="utf-8"?>
 <p:sld xmlns:a="http://schemas.openxmlformats.org/drawingml/2006/main" xmlns:r="http://schemas.openxmlformats.org/officeDocument/2006/relationships" xmlns:p="http://schemas.openxmlformats.org/presentationml/2006/main">
   <p:cSld>
@@ -4276,6 +4363,96 @@
           <a:bodyPr/>
           <a:lstStyle/>
           <a:p>
+            <a:endParaRPr lang="en-US"/>
+          </a:p>
+        </p:txBody>
+      </p:sp>
+      <p:sp>
+        <p:nvSpPr>
+          <p:cNvPr id="3" name="Content Placeholder 2"/>
+          <p:cNvSpPr>
+            <a:spLocks noGrp="1"/>
+          </p:cNvSpPr>
+          <p:nvPr>
+            <p:ph idx="1"/>
+          </p:nvPr>
+        </p:nvSpPr>
+        <p:spPr/>
+        <p:txBody>
+          <a:bodyPr/>
+          <a:lstStyle/>
+          <a:p>
+            <a:pPr marL="0" indent="0">
+              <a:buNone/>
+            </a:pPr>
+            <a:r>
+              <a:rPr lang="en-US" dirty="0" smtClean="0"/>
+              <a:t>Cost including salary: $2948 </a:t>
+            </a:r>
+          </a:p>
+          <a:p>
+            <a:pPr marL="0" indent="0">
+              <a:buNone/>
+            </a:pPr>
+            <a:endParaRPr lang="en-US" dirty="0"/>
+          </a:p>
+          <a:p>
+            <a:pPr marL="0" indent="0">
+              <a:buNone/>
+            </a:pPr>
+            <a:r>
+              <a:rPr lang="en-US" dirty="0" smtClean="0"/>
+              <a:t>Opportunity cost… enormous. </a:t>
+            </a:r>
+            <a:endParaRPr lang="en-US" dirty="0"/>
+          </a:p>
+        </p:txBody>
+      </p:sp>
+    </p:spTree>
+    <p:extLst>
+      <p:ext uri="{BB962C8B-B14F-4D97-AF65-F5344CB8AC3E}">
+        <p14:creationId xmlns:p14="http://schemas.microsoft.com/office/powerpoint/2010/main" val="700443825"/>
+      </p:ext>
+    </p:extLst>
+  </p:cSld>
+  <p:clrMapOvr>
+    <a:masterClrMapping/>
+  </p:clrMapOvr>
+</p:sld>
+</file>
+
+<file path=ppt/slides/slide15.xml><?xml version="1.0" encoding="utf-8"?>
+<p:sld xmlns:a="http://schemas.openxmlformats.org/drawingml/2006/main" xmlns:r="http://schemas.openxmlformats.org/officeDocument/2006/relationships" xmlns:p="http://schemas.openxmlformats.org/presentationml/2006/main">
+  <p:cSld>
+    <p:spTree>
+      <p:nvGrpSpPr>
+        <p:cNvPr id="1" name=""/>
+        <p:cNvGrpSpPr/>
+        <p:nvPr/>
+      </p:nvGrpSpPr>
+      <p:grpSpPr>
+        <a:xfrm>
+          <a:off x="0" y="0"/>
+          <a:ext cx="0" cy="0"/>
+          <a:chOff x="0" y="0"/>
+          <a:chExt cx="0" cy="0"/>
+        </a:xfrm>
+      </p:grpSpPr>
+      <p:sp>
+        <p:nvSpPr>
+          <p:cNvPr id="2" name="Title 1"/>
+          <p:cNvSpPr>
+            <a:spLocks noGrp="1"/>
+          </p:cNvSpPr>
+          <p:nvPr>
+            <p:ph type="title"/>
+          </p:nvPr>
+        </p:nvSpPr>
+        <p:spPr/>
+        <p:txBody>
+          <a:bodyPr/>
+          <a:lstStyle/>
+          <a:p>
             <a:r>
               <a:rPr lang="en-US" dirty="0" smtClean="0"/>
               <a:t>Crisis? What Crisis? </a:t>
@@ -4333,7 +4510,7 @@
 </p:sld>
 </file>
 
-<file path=ppt/slides/slide15.xml><?xml version="1.0" encoding="utf-8"?>
+<file path=ppt/slides/slide16.xml><?xml version="1.0" encoding="utf-8"?>
 <p:sld xmlns:a="http://schemas.openxmlformats.org/drawingml/2006/main" xmlns:r="http://schemas.openxmlformats.org/officeDocument/2006/relationships" xmlns:p="http://schemas.openxmlformats.org/presentationml/2006/main">
   <p:cSld>
     <p:spTree>
@@ -4497,7 +4674,7 @@
 </p:sld>
 </file>
 
-<file path=ppt/slides/slide16.xml><?xml version="1.0" encoding="utf-8"?>
+<file path=ppt/slides/slide17.xml><?xml version="1.0" encoding="utf-8"?>
 <p:sld xmlns:a="http://schemas.openxmlformats.org/drawingml/2006/main" xmlns:r="http://schemas.openxmlformats.org/officeDocument/2006/relationships" xmlns:p="http://schemas.openxmlformats.org/presentationml/2006/main">
   <p:cSld>
     <p:spTree>
@@ -4580,7 +4757,7 @@
 </p:sld>
 </file>
 
-<file path=ppt/slides/slide17.xml><?xml version="1.0" encoding="utf-8"?>
+<file path=ppt/slides/slide18.xml><?xml version="1.0" encoding="utf-8"?>
 <p:sld xmlns:a="http://schemas.openxmlformats.org/drawingml/2006/main" xmlns:r="http://schemas.openxmlformats.org/officeDocument/2006/relationships" xmlns:p="http://schemas.openxmlformats.org/presentationml/2006/main">
   <p:cSld>
     <p:spTree>
@@ -4668,7 +4845,7 @@
 </p:sld>
 </file>
 
-<file path=ppt/slides/slide18.xml><?xml version="1.0" encoding="utf-8"?>
+<file path=ppt/slides/slide19.xml><?xml version="1.0" encoding="utf-8"?>
 <p:sld xmlns:a="http://schemas.openxmlformats.org/drawingml/2006/main" xmlns:r="http://schemas.openxmlformats.org/officeDocument/2006/relationships" xmlns:p="http://schemas.openxmlformats.org/presentationml/2006/main">
   <p:cSld>
     <p:spTree>
@@ -4792,6 +4969,131 @@
           <a:bodyPr/>
           <a:lstStyle/>
           <a:p>
+            <a:endParaRPr lang="en-US"/>
+          </a:p>
+        </p:txBody>
+      </p:sp>
+      <p:sp>
+        <p:nvSpPr>
+          <p:cNvPr id="3" name="Content Placeholder 2"/>
+          <p:cNvSpPr>
+            <a:spLocks noGrp="1"/>
+          </p:cNvSpPr>
+          <p:nvPr>
+            <p:ph idx="1"/>
+          </p:nvPr>
+        </p:nvSpPr>
+        <p:spPr/>
+        <p:txBody>
+          <a:bodyPr/>
+          <a:lstStyle/>
+          <a:p>
+            <a:r>
+              <a:rPr lang="en-US" dirty="0" smtClean="0"/>
+              <a:t>Chorus </a:t>
+            </a:r>
+            <a:r>
+              <a:rPr lang="en-US" dirty="0" smtClean="0">
+                <a:hlinkClick r:id="rId2"/>
+              </a:rPr>
+              <a:t>http</a:t>
+            </a:r>
+            <a:r>
+              <a:rPr lang="en-US" dirty="0">
+                <a:hlinkClick r:id="rId2"/>
+              </a:rPr>
+              <a:t>://www.chorusaccess.org</a:t>
+            </a:r>
+            <a:r>
+              <a:rPr lang="en-US" dirty="0" smtClean="0">
+                <a:hlinkClick r:id="rId2"/>
+              </a:rPr>
+              <a:t>/</a:t>
+            </a:r>
+            <a:endParaRPr lang="en-US" dirty="0" smtClean="0"/>
+          </a:p>
+          <a:p>
+            <a:r>
+              <a:rPr lang="en-US" dirty="0"/>
+              <a:t>Share </a:t>
+            </a:r>
+            <a:r>
+              <a:rPr lang="en-US" dirty="0">
+                <a:hlinkClick r:id="rId3"/>
+              </a:rPr>
+              <a:t>http://www.arl.org</a:t>
+            </a:r>
+            <a:r>
+              <a:rPr lang="en-US">
+                <a:hlinkClick r:id="rId3"/>
+              </a:rPr>
+              <a:t>/focus-areas/shared-access-research-ecosystem-share#</a:t>
+            </a:r>
+            <a:r>
+              <a:rPr lang="en-US">
+                <a:hlinkClick r:id="rId3"/>
+              </a:rPr>
+              <a:t>.</a:t>
+            </a:r>
+            <a:r>
+              <a:rPr lang="en-US" smtClean="0">
+                <a:hlinkClick r:id="rId3"/>
+              </a:rPr>
+              <a:t>VMUyv8ayX_8</a:t>
+            </a:r>
+            <a:r>
+              <a:rPr lang="en-US" smtClean="0"/>
+              <a:t> </a:t>
+            </a:r>
+            <a:endParaRPr lang="en-US" dirty="0"/>
+          </a:p>
+        </p:txBody>
+      </p:sp>
+    </p:spTree>
+    <p:extLst>
+      <p:ext uri="{BB962C8B-B14F-4D97-AF65-F5344CB8AC3E}">
+        <p14:creationId xmlns:p14="http://schemas.microsoft.com/office/powerpoint/2010/main" val="2430676959"/>
+      </p:ext>
+    </p:extLst>
+  </p:cSld>
+  <p:clrMapOvr>
+    <a:masterClrMapping/>
+  </p:clrMapOvr>
+</p:sld>
+</file>
+
+<file path=ppt/slides/slide3.xml><?xml version="1.0" encoding="utf-8"?>
+<p:sld xmlns:a="http://schemas.openxmlformats.org/drawingml/2006/main" xmlns:r="http://schemas.openxmlformats.org/officeDocument/2006/relationships" xmlns:p="http://schemas.openxmlformats.org/presentationml/2006/main">
+  <p:cSld>
+    <p:spTree>
+      <p:nvGrpSpPr>
+        <p:cNvPr id="1" name=""/>
+        <p:cNvGrpSpPr/>
+        <p:nvPr/>
+      </p:nvGrpSpPr>
+      <p:grpSpPr>
+        <a:xfrm>
+          <a:off x="0" y="0"/>
+          <a:ext cx="0" cy="0"/>
+          <a:chOff x="0" y="0"/>
+          <a:chExt cx="0" cy="0"/>
+        </a:xfrm>
+      </p:grpSpPr>
+      <p:sp>
+        <p:nvSpPr>
+          <p:cNvPr id="2" name="Title 1"/>
+          <p:cNvSpPr>
+            <a:spLocks noGrp="1"/>
+          </p:cNvSpPr>
+          <p:nvPr>
+            <p:ph type="title"/>
+          </p:nvPr>
+        </p:nvSpPr>
+        <p:spPr/>
+        <p:txBody>
+          <a:bodyPr/>
+          <a:lstStyle/>
+          <a:p>
             <a:r>
               <a:rPr lang="en-US" dirty="0" smtClean="0"/>
               <a:t>Advantage </a:t>
@@ -4907,7 +5209,7 @@
 </p:sld>
 </file>
 
-<file path=ppt/slides/slide3.xml><?xml version="1.0" encoding="utf-8"?>
+<file path=ppt/slides/slide4.xml><?xml version="1.0" encoding="utf-8"?>
 <p:sld xmlns:a="http://schemas.openxmlformats.org/drawingml/2006/main" xmlns:r="http://schemas.openxmlformats.org/officeDocument/2006/relationships" xmlns:p="http://schemas.openxmlformats.org/presentationml/2006/main">
   <p:cSld>
     <p:spTree>
@@ -4967,7 +5269,7 @@
 </p:sld>
 </file>
 
-<file path=ppt/slides/slide4.xml><?xml version="1.0" encoding="utf-8"?>
+<file path=ppt/slides/slide5.xml><?xml version="1.0" encoding="utf-8"?>
 <p:sld xmlns:a="http://schemas.openxmlformats.org/drawingml/2006/main" xmlns:r="http://schemas.openxmlformats.org/officeDocument/2006/relationships" xmlns:p="http://schemas.openxmlformats.org/presentationml/2006/main">
   <p:cSld>
     <p:spTree>
@@ -5027,93 +5329,6 @@
 </p:sld>
 </file>
 
-<file path=ppt/slides/slide5.xml><?xml version="1.0" encoding="utf-8"?>
-<p:sld xmlns:a="http://schemas.openxmlformats.org/drawingml/2006/main" xmlns:r="http://schemas.openxmlformats.org/officeDocument/2006/relationships" xmlns:p="http://schemas.openxmlformats.org/presentationml/2006/main">
-  <p:cSld>
-    <p:spTree>
-      <p:nvGrpSpPr>
-        <p:cNvPr id="1" name=""/>
-        <p:cNvGrpSpPr/>
-        <p:nvPr/>
-      </p:nvGrpSpPr>
-      <p:grpSpPr>
-        <a:xfrm>
-          <a:off x="0" y="0"/>
-          <a:ext cx="0" cy="0"/>
-          <a:chOff x="0" y="0"/>
-          <a:chExt cx="0" cy="0"/>
-        </a:xfrm>
-      </p:grpSpPr>
-      <p:sp>
-        <p:nvSpPr>
-          <p:cNvPr id="2" name="TextBox 1"/>
-          <p:cNvSpPr txBox="1"/>
-          <p:nvPr/>
-        </p:nvSpPr>
-        <p:spPr>
-          <a:xfrm>
-            <a:off x="4051125" y="2994436"/>
-            <a:ext cx="10088030" cy="369332"/>
-          </a:xfrm>
-          <a:prstGeom prst="rect">
-            <a:avLst/>
-          </a:prstGeom>
-          <a:noFill/>
-        </p:spPr>
-        <p:txBody>
-          <a:bodyPr wrap="none" rtlCol="0">
-            <a:spAutoFit/>
-          </a:bodyPr>
-          <a:lstStyle/>
-          <a:p>
-            <a:r>
-              <a:rPr lang="en-US" dirty="0" smtClean="0"/>
-              <a:t>Find </a:t>
-            </a:r>
-            <a:r>
-              <a:rPr lang="en-US" dirty="0"/>
-              <a:t>something from here: http://</a:t>
-            </a:r>
-            <a:r>
-              <a:rPr lang="en-US" dirty="0" err="1"/>
-              <a:t>journals.plos.org</a:t>
-            </a:r>
-            <a:r>
-              <a:rPr lang="en-US" dirty="0"/>
-              <a:t>/</a:t>
-            </a:r>
-            <a:r>
-              <a:rPr lang="en-US" dirty="0" err="1"/>
-              <a:t>plosone</a:t>
-            </a:r>
-            <a:r>
-              <a:rPr lang="en-US" dirty="0"/>
-              <a:t>/</a:t>
-            </a:r>
-            <a:r>
-              <a:rPr lang="en-US" dirty="0" err="1"/>
-              <a:t>article?id</a:t>
-            </a:r>
-            <a:r>
-              <a:rPr lang="en-US" dirty="0"/>
-              <a:t>=10.1371/journal.pone.0108451#s5</a:t>
-            </a:r>
-          </a:p>
-        </p:txBody>
-      </p:sp>
-    </p:spTree>
-    <p:extLst>
-      <p:ext uri="{BB962C8B-B14F-4D97-AF65-F5344CB8AC3E}">
-        <p14:creationId xmlns:p14="http://schemas.microsoft.com/office/powerpoint/2010/main" val="2126266482"/>
-      </p:ext>
-    </p:extLst>
-  </p:cSld>
-  <p:clrMapOvr>
-    <a:masterClrMapping/>
-  </p:clrMapOvr>
-</p:sld>
-</file>
-
 <file path=ppt/slides/slide6.xml><?xml version="1.0" encoding="utf-8"?>
 <p:sld xmlns:a="http://schemas.openxmlformats.org/drawingml/2006/main" xmlns:r="http://schemas.openxmlformats.org/officeDocument/2006/relationships" xmlns:p="http://schemas.openxmlformats.org/presentationml/2006/main">
   <p:cSld>
@@ -5139,8 +5354,8 @@
         </p:nvSpPr>
         <p:spPr>
           <a:xfrm>
-            <a:off x="2484443" y="3643385"/>
-            <a:ext cx="9226467" cy="369332"/>
+            <a:off x="4051125" y="2994436"/>
+            <a:ext cx="10088030" cy="369332"/>
           </a:xfrm>
           <a:prstGeom prst="rect">
             <a:avLst/>
@@ -5154,8 +5369,12 @@
           <a:lstStyle/>
           <a:p>
             <a:r>
+              <a:rPr lang="en-US" dirty="0" smtClean="0"/>
+              <a:t>Find </a:t>
+            </a:r>
+            <a:r>
               <a:rPr lang="en-US" dirty="0"/>
-              <a:t>http://</a:t>
+              <a:t>something from here: http://</a:t>
             </a:r>
             <a:r>
               <a:rPr lang="en-US" dirty="0" err="1"/>
@@ -5179,7 +5398,7 @@
             </a:r>
             <a:r>
               <a:rPr lang="en-US" dirty="0"/>
-              <a:t>=10.1371/journal.pone.0021101#pone-0021101-g001</a:t>
+              <a:t>=10.1371/journal.pone.0108451#s5</a:t>
             </a:r>
           </a:p>
         </p:txBody>
@@ -5187,7 +5406,7 @@
     </p:spTree>
     <p:extLst>
       <p:ext uri="{BB962C8B-B14F-4D97-AF65-F5344CB8AC3E}">
-        <p14:creationId xmlns:p14="http://schemas.microsoft.com/office/powerpoint/2010/main" val="4179202291"/>
+        <p14:creationId xmlns:p14="http://schemas.microsoft.com/office/powerpoint/2010/main" val="2126266482"/>
       </p:ext>
     </p:extLst>
   </p:cSld>
@@ -5222,6 +5441,89 @@
         </p:nvSpPr>
         <p:spPr>
           <a:xfrm>
+            <a:off x="2484443" y="3643385"/>
+            <a:ext cx="9226467" cy="369332"/>
+          </a:xfrm>
+          <a:prstGeom prst="rect">
+            <a:avLst/>
+          </a:prstGeom>
+          <a:noFill/>
+        </p:spPr>
+        <p:txBody>
+          <a:bodyPr wrap="none" rtlCol="0">
+            <a:spAutoFit/>
+          </a:bodyPr>
+          <a:lstStyle/>
+          <a:p>
+            <a:r>
+              <a:rPr lang="en-US" dirty="0"/>
+              <a:t>http://</a:t>
+            </a:r>
+            <a:r>
+              <a:rPr lang="en-US" dirty="0" err="1"/>
+              <a:t>journals.plos.org</a:t>
+            </a:r>
+            <a:r>
+              <a:rPr lang="en-US" dirty="0"/>
+              <a:t>/</a:t>
+            </a:r>
+            <a:r>
+              <a:rPr lang="en-US" dirty="0" err="1"/>
+              <a:t>plosone</a:t>
+            </a:r>
+            <a:r>
+              <a:rPr lang="en-US" dirty="0"/>
+              <a:t>/</a:t>
+            </a:r>
+            <a:r>
+              <a:rPr lang="en-US" dirty="0" err="1"/>
+              <a:t>article?id</a:t>
+            </a:r>
+            <a:r>
+              <a:rPr lang="en-US" dirty="0"/>
+              <a:t>=10.1371/journal.pone.0021101#pone-0021101-g001</a:t>
+            </a:r>
+          </a:p>
+        </p:txBody>
+      </p:sp>
+    </p:spTree>
+    <p:extLst>
+      <p:ext uri="{BB962C8B-B14F-4D97-AF65-F5344CB8AC3E}">
+        <p14:creationId xmlns:p14="http://schemas.microsoft.com/office/powerpoint/2010/main" val="4179202291"/>
+      </p:ext>
+    </p:extLst>
+  </p:cSld>
+  <p:clrMapOvr>
+    <a:masterClrMapping/>
+  </p:clrMapOvr>
+</p:sld>
+</file>
+
+<file path=ppt/slides/slide8.xml><?xml version="1.0" encoding="utf-8"?>
+<p:sld xmlns:a="http://schemas.openxmlformats.org/drawingml/2006/main" xmlns:r="http://schemas.openxmlformats.org/officeDocument/2006/relationships" xmlns:p="http://schemas.openxmlformats.org/presentationml/2006/main">
+  <p:cSld>
+    <p:spTree>
+      <p:nvGrpSpPr>
+        <p:cNvPr id="1" name=""/>
+        <p:cNvGrpSpPr/>
+        <p:nvPr/>
+      </p:nvGrpSpPr>
+      <p:grpSpPr>
+        <a:xfrm>
+          <a:off x="0" y="0"/>
+          <a:ext cx="0" cy="0"/>
+          <a:chOff x="0" y="0"/>
+          <a:chExt cx="0" cy="0"/>
+        </a:xfrm>
+      </p:grpSpPr>
+      <p:sp>
+        <p:nvSpPr>
+          <p:cNvPr id="2" name="TextBox 1"/>
+          <p:cNvSpPr txBox="1"/>
+          <p:nvPr/>
+        </p:nvSpPr>
+        <p:spPr>
+          <a:xfrm>
             <a:off x="825057" y="2280592"/>
             <a:ext cx="12101953" cy="369332"/>
           </a:xfrm>
@@ -5272,7 +5574,7 @@
 </p:sld>
 </file>
 
-<file path=ppt/slides/slide8.xml><?xml version="1.0" encoding="utf-8"?>
+<file path=ppt/slides/slide9.xml><?xml version="1.0" encoding="utf-8"?>
 <p:sld xmlns:a="http://schemas.openxmlformats.org/drawingml/2006/main" xmlns:r="http://schemas.openxmlformats.org/officeDocument/2006/relationships" xmlns:p="http://schemas.openxmlformats.org/presentationml/2006/main">
   <p:cSld>
     <p:spTree>
@@ -5361,182 +5663,6 @@
     <p:extLst>
       <p:ext uri="{BB962C8B-B14F-4D97-AF65-F5344CB8AC3E}">
         <p14:creationId xmlns:p14="http://schemas.microsoft.com/office/powerpoint/2010/main" val="2537751626"/>
-      </p:ext>
-    </p:extLst>
-  </p:cSld>
-  <p:clrMapOvr>
-    <a:masterClrMapping/>
-  </p:clrMapOvr>
-</p:sld>
-</file>
-
-<file path=ppt/slides/slide9.xml><?xml version="1.0" encoding="utf-8"?>
-<p:sld xmlns:a="http://schemas.openxmlformats.org/drawingml/2006/main" xmlns:r="http://schemas.openxmlformats.org/officeDocument/2006/relationships" xmlns:p="http://schemas.openxmlformats.org/presentationml/2006/main">
-  <p:cSld>
-    <p:spTree>
-      <p:nvGrpSpPr>
-        <p:cNvPr id="1" name=""/>
-        <p:cNvGrpSpPr/>
-        <p:nvPr/>
-      </p:nvGrpSpPr>
-      <p:grpSpPr>
-        <a:xfrm>
-          <a:off x="0" y="0"/>
-          <a:ext cx="0" cy="0"/>
-          <a:chOff x="0" y="0"/>
-          <a:chExt cx="0" cy="0"/>
-        </a:xfrm>
-      </p:grpSpPr>
-      <p:sp>
-        <p:nvSpPr>
-          <p:cNvPr id="2" name="Title 1"/>
-          <p:cNvSpPr>
-            <a:spLocks noGrp="1"/>
-          </p:cNvSpPr>
-          <p:nvPr>
-            <p:ph type="title"/>
-          </p:nvPr>
-        </p:nvSpPr>
-        <p:spPr>
-          <a:xfrm>
-            <a:off x="352941" y="274638"/>
-            <a:ext cx="8229600" cy="1143000"/>
-          </a:xfrm>
-        </p:spPr>
-        <p:txBody>
-          <a:bodyPr/>
-          <a:lstStyle/>
-          <a:p>
-            <a:r>
-              <a:rPr lang="en-US" dirty="0" smtClean="0">
-                <a:solidFill>
-                  <a:schemeClr val="bg1">
-                    <a:lumMod val="65000"/>
-                  </a:schemeClr>
-                </a:solidFill>
-              </a:rPr>
-              <a:t>Agenda</a:t>
-            </a:r>
-            <a:endParaRPr lang="en-US" dirty="0">
-              <a:solidFill>
-                <a:schemeClr val="bg1">
-                  <a:lumMod val="65000"/>
-                </a:schemeClr>
-              </a:solidFill>
-            </a:endParaRPr>
-          </a:p>
-        </p:txBody>
-      </p:sp>
-      <p:sp>
-        <p:nvSpPr>
-          <p:cNvPr id="3" name="Content Placeholder 2"/>
-          <p:cNvSpPr>
-            <a:spLocks noGrp="1"/>
-          </p:cNvSpPr>
-          <p:nvPr>
-            <p:ph idx="1"/>
-          </p:nvPr>
-        </p:nvSpPr>
-        <p:spPr/>
-        <p:txBody>
-          <a:bodyPr>
-            <a:normAutofit lnSpcReduction="10000"/>
-          </a:bodyPr>
-          <a:lstStyle/>
-          <a:p>
-            <a:pPr marL="0" indent="0">
-              <a:buNone/>
-            </a:pPr>
-            <a:r>
-              <a:rPr lang="en-US" b="1" dirty="0" smtClean="0"/>
-              <a:t>The Context of Research Data Curation</a:t>
-            </a:r>
-          </a:p>
-          <a:p>
-            <a:pPr lvl="1">
-              <a:buFontTx/>
-              <a:buChar char="-"/>
-            </a:pPr>
-            <a:r>
-              <a:rPr lang="en-US" dirty="0" smtClean="0"/>
-              <a:t>Economic Investment in Public Goods</a:t>
-            </a:r>
-          </a:p>
-          <a:p>
-            <a:pPr lvl="1">
-              <a:buFontTx/>
-              <a:buChar char="-"/>
-            </a:pPr>
-            <a:r>
-              <a:rPr lang="en-US" dirty="0" smtClean="0"/>
-              <a:t>Reproducibility of New Knowledge</a:t>
-            </a:r>
-          </a:p>
-          <a:p>
-            <a:pPr marL="0" indent="0">
-              <a:buNone/>
-            </a:pPr>
-            <a:r>
-              <a:rPr lang="en-US" b="1" dirty="0" smtClean="0"/>
-              <a:t>Open Data</a:t>
-            </a:r>
-          </a:p>
-          <a:p>
-            <a:pPr lvl="1">
-              <a:buFontTx/>
-              <a:buChar char="-"/>
-            </a:pPr>
-            <a:r>
-              <a:rPr lang="en-US" dirty="0" smtClean="0"/>
-              <a:t>Government + Commercial Sector</a:t>
-            </a:r>
-          </a:p>
-          <a:p>
-            <a:pPr lvl="1">
-              <a:buFontTx/>
-              <a:buChar char="-"/>
-            </a:pPr>
-            <a:r>
-              <a:rPr lang="en-US" dirty="0" smtClean="0"/>
-              <a:t>Research + Higher Education</a:t>
-            </a:r>
-          </a:p>
-          <a:p>
-            <a:pPr marL="0" indent="0">
-              <a:buNone/>
-            </a:pPr>
-            <a:r>
-              <a:rPr lang="en-US" b="1" dirty="0" smtClean="0"/>
-              <a:t>Scholarly Communications</a:t>
-            </a:r>
-          </a:p>
-          <a:p>
-            <a:pPr lvl="1">
-              <a:buFontTx/>
-              <a:buChar char="-"/>
-            </a:pPr>
-            <a:r>
-              <a:rPr lang="en-US" dirty="0" smtClean="0"/>
-              <a:t>Decoupling the scholarly record</a:t>
-            </a:r>
-          </a:p>
-          <a:p>
-            <a:pPr lvl="1">
-              <a:buFontTx/>
-              <a:buChar char="-"/>
-            </a:pPr>
-            <a:r>
-              <a:rPr lang="en-US" dirty="0" smtClean="0"/>
-              <a:t>Research Objects as first-class scholarly products  </a:t>
-            </a:r>
-            <a:endParaRPr lang="en-US" dirty="0"/>
-          </a:p>
-        </p:txBody>
-      </p:sp>
-    </p:spTree>
-    <p:extLst>
-      <p:ext uri="{BB962C8B-B14F-4D97-AF65-F5344CB8AC3E}">
-        <p14:creationId xmlns:p14="http://schemas.microsoft.com/office/powerpoint/2010/main" val="1970159385"/>
       </p:ext>
     </p:extLst>
   </p:cSld>

</xml_diff>

<commit_message>
making commits after dark
</commit_message>
<xml_diff>
--- a/Day_1/Plenary/Day_1_Plenary_OpenData.pptx
+++ b/Day_1/Plenary/Day_1_Plenary_OpenData.pptx
@@ -5,7 +5,7 @@
     <p:sldMasterId id="2147483648" r:id="rId1"/>
   </p:sldMasterIdLst>
   <p:notesMasterIdLst>
-    <p:notesMasterId r:id="rId22"/>
+    <p:notesMasterId r:id="rId23"/>
   </p:notesMasterIdLst>
   <p:sldIdLst>
     <p:sldId id="258" r:id="rId2"/>
@@ -13,21 +13,22 @@
     <p:sldId id="275" r:id="rId4"/>
     <p:sldId id="273" r:id="rId5"/>
     <p:sldId id="268" r:id="rId6"/>
-    <p:sldId id="269" r:id="rId7"/>
-    <p:sldId id="270" r:id="rId8"/>
-    <p:sldId id="271" r:id="rId9"/>
-    <p:sldId id="272" r:id="rId10"/>
-    <p:sldId id="257" r:id="rId11"/>
-    <p:sldId id="259" r:id="rId12"/>
-    <p:sldId id="260" r:id="rId13"/>
-    <p:sldId id="262" r:id="rId14"/>
-    <p:sldId id="261" r:id="rId15"/>
-    <p:sldId id="267" r:id="rId16"/>
-    <p:sldId id="263" r:id="rId17"/>
-    <p:sldId id="256" r:id="rId18"/>
-    <p:sldId id="264" r:id="rId19"/>
-    <p:sldId id="266" r:id="rId20"/>
-    <p:sldId id="274" r:id="rId21"/>
+    <p:sldId id="277" r:id="rId7"/>
+    <p:sldId id="269" r:id="rId8"/>
+    <p:sldId id="270" r:id="rId9"/>
+    <p:sldId id="271" r:id="rId10"/>
+    <p:sldId id="272" r:id="rId11"/>
+    <p:sldId id="257" r:id="rId12"/>
+    <p:sldId id="259" r:id="rId13"/>
+    <p:sldId id="260" r:id="rId14"/>
+    <p:sldId id="262" r:id="rId15"/>
+    <p:sldId id="261" r:id="rId16"/>
+    <p:sldId id="267" r:id="rId17"/>
+    <p:sldId id="263" r:id="rId18"/>
+    <p:sldId id="256" r:id="rId19"/>
+    <p:sldId id="264" r:id="rId20"/>
+    <p:sldId id="266" r:id="rId21"/>
+    <p:sldId id="274" r:id="rId22"/>
   </p:sldIdLst>
   <p:sldSz cx="9144000" cy="6858000" type="screen4x3"/>
   <p:notesSz cx="6858000" cy="9144000"/>
@@ -211,7 +212,7 @@
           <a:p>
             <a:fld id="{27377218-730A-A747-A2EA-360839892EA2}" type="datetimeFigureOut">
               <a:rPr lang="en-US" smtClean="0"/>
-              <a:t>1/27/15</a:t>
+              <a:t>2/8/15</a:t>
             </a:fld>
             <a:endParaRPr lang="en-US"/>
           </a:p>
@@ -539,6 +540,10 @@
               <a:rPr lang="en-US" baseline="0" dirty="0" smtClean="0"/>
               <a:t>… but I am going to build an argument based on economics – and efficiency. </a:t>
             </a:r>
+            <a:endParaRPr lang="en-US" baseline="0" dirty="0" smtClean="0"/>
+          </a:p>
+          <a:p>
+            <a:endParaRPr lang="en-US" baseline="0" dirty="0" smtClean="0"/>
           </a:p>
           <a:p>
             <a:r>
@@ -547,10 +552,10 @@
             </a:r>
           </a:p>
           <a:p>
-            <a:endParaRPr lang="en-US" baseline="0" smtClean="0"/>
-          </a:p>
-          <a:p>
-            <a:endParaRPr lang="en-US"/>
+            <a:endParaRPr lang="en-US" baseline="0" dirty="0" smtClean="0"/>
+          </a:p>
+          <a:p>
+            <a:endParaRPr lang="en-US" dirty="0"/>
           </a:p>
         </p:txBody>
       </p:sp>
@@ -636,22 +641,38 @@
           <a:p>
             <a:r>
               <a:rPr lang="en-US" dirty="0" smtClean="0"/>
-              <a:t>We should want to improve this process,</a:t>
+              <a:t>The problem isn’t so much the archives…</a:t>
             </a:r>
             <a:r>
               <a:rPr lang="en-US" baseline="0" dirty="0" smtClean="0"/>
-              <a:t> not only because it saves money ,,, but because it is the only tenable way to move research forward… think about how much time our students will spend doing these activities as the result of federal </a:t>
+              <a:t> bigger, larger data sits in archives – the Sloan Digital Sky Survey for instance… </a:t>
+            </a:r>
+          </a:p>
+          <a:p>
+            <a:endParaRPr lang="en-US" baseline="0" dirty="0" smtClean="0"/>
+          </a:p>
+          <a:p>
+            <a:r>
+              <a:rPr lang="en-US" baseline="0" dirty="0" smtClean="0"/>
+              <a:t>And small data – I mean on the single digit megabyte scale – the type that sits in tables – that really isn’t so much of a problem. Journals occasionally host this small data for free – and there now exists a number of very reliable software for extracting this data from publications… it is not ideal, but it is not a problem like the </a:t>
             </a:r>
             <a:r>
               <a:rPr lang="en-US" baseline="0" dirty="0" err="1" smtClean="0"/>
-              <a:t>initatives</a:t>
-            </a:r>
+              <a:t>HodgePodge</a:t>
+            </a:r>
+            <a:r>
+              <a:rPr lang="en-US" baseline="0" dirty="0" smtClean="0"/>
+              <a:t> is a problem. </a:t>
+            </a:r>
+          </a:p>
+          <a:p>
             <a:endParaRPr lang="en-US" baseline="0" dirty="0" smtClean="0"/>
           </a:p>
           <a:p>
-            <a:endParaRPr lang="en-US" baseline="0" dirty="0" smtClean="0"/>
-          </a:p>
-          <a:p>
+            <a:r>
+              <a:rPr lang="en-US" baseline="0" dirty="0" smtClean="0"/>
+              <a:t>The hodgepodge is the medium sized data that sits on servers, in </a:t>
+            </a:r>
             <a:endParaRPr lang="en-US" dirty="0"/>
           </a:p>
         </p:txBody>
@@ -673,7 +694,7 @@
           <a:p>
             <a:fld id="{E7BCF3C9-BCDD-8D45-9AD8-23E648023F32}" type="slidenum">
               <a:rPr lang="en-US" smtClean="0"/>
-              <a:t>14</a:t>
+              <a:t>6</a:t>
             </a:fld>
             <a:endParaRPr lang="en-US"/>
           </a:p>
@@ -682,7 +703,7 @@
     </p:spTree>
     <p:extLst>
       <p:ext uri="{BB962C8B-B14F-4D97-AF65-F5344CB8AC3E}">
-        <p14:creationId xmlns:p14="http://schemas.microsoft.com/office/powerpoint/2010/main" val="1375266549"/>
+        <p14:creationId xmlns:p14="http://schemas.microsoft.com/office/powerpoint/2010/main" val="1846027949"/>
       </p:ext>
     </p:extLst>
   </p:cSld>
@@ -738,6 +759,108 @@
           <a:p>
             <a:r>
               <a:rPr lang="en-US" dirty="0" smtClean="0"/>
+              <a:t>We should want to improve this process,</a:t>
+            </a:r>
+            <a:r>
+              <a:rPr lang="en-US" baseline="0" dirty="0" smtClean="0"/>
+              <a:t> not only because it saves money ,,, but because it is the only tenable way to move research forward… think about how much time our students will spend doing these activities as the result of federal </a:t>
+            </a:r>
+            <a:r>
+              <a:rPr lang="en-US" baseline="0" dirty="0" err="1" smtClean="0"/>
+              <a:t>initatives</a:t>
+            </a:r>
+            <a:endParaRPr lang="en-US" baseline="0" dirty="0" smtClean="0"/>
+          </a:p>
+          <a:p>
+            <a:endParaRPr lang="en-US" baseline="0" dirty="0" smtClean="0"/>
+          </a:p>
+          <a:p>
+            <a:endParaRPr lang="en-US" dirty="0"/>
+          </a:p>
+        </p:txBody>
+      </p:sp>
+      <p:sp>
+        <p:nvSpPr>
+          <p:cNvPr id="4" name="Slide Number Placeholder 3"/>
+          <p:cNvSpPr>
+            <a:spLocks noGrp="1"/>
+          </p:cNvSpPr>
+          <p:nvPr>
+            <p:ph type="sldNum" sz="quarter" idx="10"/>
+          </p:nvPr>
+        </p:nvSpPr>
+        <p:spPr/>
+        <p:txBody>
+          <a:bodyPr/>
+          <a:lstStyle/>
+          <a:p>
+            <a:fld id="{E7BCF3C9-BCDD-8D45-9AD8-23E648023F32}" type="slidenum">
+              <a:rPr lang="en-US" smtClean="0"/>
+              <a:t>15</a:t>
+            </a:fld>
+            <a:endParaRPr lang="en-US"/>
+          </a:p>
+        </p:txBody>
+      </p:sp>
+    </p:spTree>
+    <p:extLst>
+      <p:ext uri="{BB962C8B-B14F-4D97-AF65-F5344CB8AC3E}">
+        <p14:creationId xmlns:p14="http://schemas.microsoft.com/office/powerpoint/2010/main" val="1375266549"/>
+      </p:ext>
+    </p:extLst>
+  </p:cSld>
+  <p:clrMapOvr>
+    <a:masterClrMapping/>
+  </p:clrMapOvr>
+</p:notes>
+</file>
+
+<file path=ppt/notesSlides/notesSlide4.xml><?xml version="1.0" encoding="utf-8"?>
+<p:notes xmlns:a="http://schemas.openxmlformats.org/drawingml/2006/main" xmlns:r="http://schemas.openxmlformats.org/officeDocument/2006/relationships" xmlns:p="http://schemas.openxmlformats.org/presentationml/2006/main">
+  <p:cSld>
+    <p:spTree>
+      <p:nvGrpSpPr>
+        <p:cNvPr id="1" name=""/>
+        <p:cNvGrpSpPr/>
+        <p:nvPr/>
+      </p:nvGrpSpPr>
+      <p:grpSpPr>
+        <a:xfrm>
+          <a:off x="0" y="0"/>
+          <a:ext cx="0" cy="0"/>
+          <a:chOff x="0" y="0"/>
+          <a:chExt cx="0" cy="0"/>
+        </a:xfrm>
+      </p:grpSpPr>
+      <p:sp>
+        <p:nvSpPr>
+          <p:cNvPr id="2" name="Slide Image Placeholder 1"/>
+          <p:cNvSpPr>
+            <a:spLocks noGrp="1" noRot="1" noChangeAspect="1"/>
+          </p:cNvSpPr>
+          <p:nvPr>
+            <p:ph type="sldImg"/>
+          </p:nvPr>
+        </p:nvSpPr>
+        <p:spPr/>
+      </p:sp>
+      <p:sp>
+        <p:nvSpPr>
+          <p:cNvPr id="3" name="Notes Placeholder 2"/>
+          <p:cNvSpPr>
+            <a:spLocks noGrp="1"/>
+          </p:cNvSpPr>
+          <p:nvPr>
+            <p:ph type="body" idx="1"/>
+          </p:nvPr>
+        </p:nvSpPr>
+        <p:spPr/>
+        <p:txBody>
+          <a:bodyPr/>
+          <a:lstStyle/>
+          <a:p>
+            <a:r>
+              <a:rPr lang="en-US" dirty="0" smtClean="0"/>
               <a:t>http://</a:t>
             </a:r>
             <a:r>
@@ -777,7 +900,7 @@
           <a:p>
             <a:fld id="{E7BCF3C9-BCDD-8D45-9AD8-23E648023F32}" type="slidenum">
               <a:rPr lang="en-US" smtClean="0"/>
-              <a:t>15</a:t>
+              <a:t>16</a:t>
             </a:fld>
             <a:endParaRPr lang="en-US"/>
           </a:p>
@@ -977,7 +1100,7 @@
           <a:p>
             <a:fld id="{89ACF3DB-EC51-3840-900F-470751CD5404}" type="datetimeFigureOut">
               <a:rPr lang="en-US" smtClean="0"/>
-              <a:t>1/27/15</a:t>
+              <a:t>2/8/15</a:t>
             </a:fld>
             <a:endParaRPr lang="en-US"/>
           </a:p>
@@ -1147,7 +1270,7 @@
           <a:p>
             <a:fld id="{89ACF3DB-EC51-3840-900F-470751CD5404}" type="datetimeFigureOut">
               <a:rPr lang="en-US" smtClean="0"/>
-              <a:t>1/27/15</a:t>
+              <a:t>2/8/15</a:t>
             </a:fld>
             <a:endParaRPr lang="en-US"/>
           </a:p>
@@ -1327,7 +1450,7 @@
           <a:p>
             <a:fld id="{89ACF3DB-EC51-3840-900F-470751CD5404}" type="datetimeFigureOut">
               <a:rPr lang="en-US" smtClean="0"/>
-              <a:t>1/27/15</a:t>
+              <a:t>2/8/15</a:t>
             </a:fld>
             <a:endParaRPr lang="en-US"/>
           </a:p>
@@ -1497,7 +1620,7 @@
           <a:p>
             <a:fld id="{89ACF3DB-EC51-3840-900F-470751CD5404}" type="datetimeFigureOut">
               <a:rPr lang="en-US" smtClean="0"/>
-              <a:t>1/27/15</a:t>
+              <a:t>2/8/15</a:t>
             </a:fld>
             <a:endParaRPr lang="en-US"/>
           </a:p>
@@ -1743,7 +1866,7 @@
           <a:p>
             <a:fld id="{89ACF3DB-EC51-3840-900F-470751CD5404}" type="datetimeFigureOut">
               <a:rPr lang="en-US" smtClean="0"/>
-              <a:t>1/27/15</a:t>
+              <a:t>2/8/15</a:t>
             </a:fld>
             <a:endParaRPr lang="en-US"/>
           </a:p>
@@ -2031,7 +2154,7 @@
           <a:p>
             <a:fld id="{89ACF3DB-EC51-3840-900F-470751CD5404}" type="datetimeFigureOut">
               <a:rPr lang="en-US" smtClean="0"/>
-              <a:t>1/27/15</a:t>
+              <a:t>2/8/15</a:t>
             </a:fld>
             <a:endParaRPr lang="en-US"/>
           </a:p>
@@ -2453,7 +2576,7 @@
           <a:p>
             <a:fld id="{89ACF3DB-EC51-3840-900F-470751CD5404}" type="datetimeFigureOut">
               <a:rPr lang="en-US" smtClean="0"/>
-              <a:t>1/27/15</a:t>
+              <a:t>2/8/15</a:t>
             </a:fld>
             <a:endParaRPr lang="en-US"/>
           </a:p>
@@ -2571,7 +2694,7 @@
           <a:p>
             <a:fld id="{89ACF3DB-EC51-3840-900F-470751CD5404}" type="datetimeFigureOut">
               <a:rPr lang="en-US" smtClean="0"/>
-              <a:t>1/27/15</a:t>
+              <a:t>2/8/15</a:t>
             </a:fld>
             <a:endParaRPr lang="en-US"/>
           </a:p>
@@ -2666,7 +2789,7 @@
           <a:p>
             <a:fld id="{89ACF3DB-EC51-3840-900F-470751CD5404}" type="datetimeFigureOut">
               <a:rPr lang="en-US" smtClean="0"/>
-              <a:t>1/27/15</a:t>
+              <a:t>2/8/15</a:t>
             </a:fld>
             <a:endParaRPr lang="en-US"/>
           </a:p>
@@ -2943,7 +3066,7 @@
           <a:p>
             <a:fld id="{89ACF3DB-EC51-3840-900F-470751CD5404}" type="datetimeFigureOut">
               <a:rPr lang="en-US" smtClean="0"/>
-              <a:t>1/27/15</a:t>
+              <a:t>2/8/15</a:t>
             </a:fld>
             <a:endParaRPr lang="en-US"/>
           </a:p>
@@ -3196,7 +3319,7 @@
           <a:p>
             <a:fld id="{89ACF3DB-EC51-3840-900F-470751CD5404}" type="datetimeFigureOut">
               <a:rPr lang="en-US" smtClean="0"/>
-              <a:t>1/27/15</a:t>
+              <a:t>2/8/15</a:t>
             </a:fld>
             <a:endParaRPr lang="en-US"/>
           </a:p>
@@ -3409,7 +3532,7 @@
           <a:p>
             <a:fld id="{89ACF3DB-EC51-3840-900F-470751CD5404}" type="datetimeFigureOut">
               <a:rPr lang="en-US" smtClean="0"/>
-              <a:t>1/27/15</a:t>
+              <a:t>2/8/15</a:t>
             </a:fld>
             <a:endParaRPr lang="en-US"/>
           </a:p>
@@ -3911,70 +4034,47 @@
           <a:chExt cx="0" cy="0"/>
         </a:xfrm>
       </p:grpSpPr>
-      <p:pic>
-        <p:nvPicPr>
-          <p:cNvPr id="4" name="Picture 3"/>
-          <p:cNvPicPr>
-            <a:picLocks noChangeAspect="1"/>
-          </p:cNvPicPr>
+      <p:sp>
+        <p:nvSpPr>
+          <p:cNvPr id="2" name="TextBox 1"/>
+          <p:cNvSpPr txBox="1"/>
           <p:nvPr/>
-        </p:nvPicPr>
-        <p:blipFill>
-          <a:blip r:embed="rId2"/>
-          <a:stretch>
-            <a:fillRect/>
-          </a:stretch>
-        </p:blipFill>
+        </p:nvSpPr>
         <p:spPr>
           <a:xfrm>
-            <a:off x="2008374" y="2693122"/>
-            <a:ext cx="4790368" cy="2689976"/>
+            <a:off x="825057" y="2280592"/>
+            <a:ext cx="12101953" cy="369332"/>
           </a:xfrm>
           <a:prstGeom prst="rect">
             <a:avLst/>
           </a:prstGeom>
+          <a:noFill/>
         </p:spPr>
-      </p:pic>
-      <p:sp>
-        <p:nvSpPr>
-          <p:cNvPr id="2" name="Rectangle 1"/>
-          <p:cNvSpPr/>
-          <p:nvPr/>
-        </p:nvSpPr>
-        <p:spPr>
-          <a:xfrm>
-            <a:off x="1252886" y="6566546"/>
-            <a:ext cx="6642373" cy="215444"/>
-          </a:xfrm>
-          <a:prstGeom prst="rect">
-            <a:avLst/>
-          </a:prstGeom>
-        </p:spPr>
-        <p:txBody>
-          <a:bodyPr wrap="square">
+        <p:txBody>
+          <a:bodyPr wrap="none" rtlCol="0">
             <a:spAutoFit/>
           </a:bodyPr>
           <a:lstStyle/>
           <a:p>
             <a:r>
-              <a:rPr lang="en-US" sz="800" dirty="0"/>
+              <a:rPr lang="en-US" dirty="0"/>
               <a:t>http://</a:t>
             </a:r>
             <a:r>
-              <a:rPr lang="en-US" sz="800" dirty="0" err="1"/>
-              <a:t>opensource.com</a:t>
-            </a:r>
-            <a:r>
-              <a:rPr lang="en-US" sz="800" dirty="0"/>
-              <a:t>/sites/default/files/styles/image-full-size/public/images/government/</a:t>
-            </a:r>
-            <a:r>
-              <a:rPr lang="en-US" sz="800" dirty="0" err="1"/>
-              <a:t>OSCD_GOV_open_data_standards.png?itok</a:t>
-            </a:r>
-            <a:r>
-              <a:rPr lang="en-US" sz="800" dirty="0"/>
-              <a:t>=igpITdY0</a:t>
+              <a:rPr lang="en-US" dirty="0" err="1"/>
+              <a:t>journals.lww.com</a:t>
+            </a:r>
+            <a:r>
+              <a:rPr lang="en-US" dirty="0"/>
+              <a:t>/</a:t>
+            </a:r>
+            <a:r>
+              <a:rPr lang="en-US" dirty="0" err="1"/>
+              <a:t>academicmedicine</a:t>
+            </a:r>
+            <a:r>
+              <a:rPr lang="en-US" dirty="0"/>
+              <a:t>/Abstract/2006/02000/Data_Withholding_in_Genetics_and_the_Other_Life.6.aspx</a:t>
             </a:r>
           </a:p>
         </p:txBody>
@@ -3982,7 +4082,7 @@
     </p:spTree>
     <p:extLst>
       <p:ext uri="{BB962C8B-B14F-4D97-AF65-F5344CB8AC3E}">
-        <p14:creationId xmlns:p14="http://schemas.microsoft.com/office/powerpoint/2010/main" val="2537751626"/>
+        <p14:creationId xmlns:p14="http://schemas.microsoft.com/office/powerpoint/2010/main" val="146087477"/>
       </p:ext>
     </p:extLst>
   </p:cSld>
@@ -4009,156 +4109,78 @@
           <a:chExt cx="0" cy="0"/>
         </a:xfrm>
       </p:grpSpPr>
-      <p:sp>
-        <p:nvSpPr>
-          <p:cNvPr id="2" name="Title 1"/>
-          <p:cNvSpPr>
-            <a:spLocks noGrp="1"/>
-          </p:cNvSpPr>
-          <p:nvPr>
-            <p:ph type="title"/>
-          </p:nvPr>
-        </p:nvSpPr>
+      <p:pic>
+        <p:nvPicPr>
+          <p:cNvPr id="4" name="Picture 3"/>
+          <p:cNvPicPr>
+            <a:picLocks noChangeAspect="1"/>
+          </p:cNvPicPr>
+          <p:nvPr/>
+        </p:nvPicPr>
+        <p:blipFill>
+          <a:blip r:embed="rId2"/>
+          <a:stretch>
+            <a:fillRect/>
+          </a:stretch>
+        </p:blipFill>
         <p:spPr>
           <a:xfrm>
-            <a:off x="352941" y="274638"/>
-            <a:ext cx="8229600" cy="1143000"/>
+            <a:off x="2008374" y="2693122"/>
+            <a:ext cx="4790368" cy="2689976"/>
           </a:xfrm>
+          <a:prstGeom prst="rect">
+            <a:avLst/>
+          </a:prstGeom>
         </p:spPr>
-        <p:txBody>
-          <a:bodyPr/>
-          <a:lstStyle/>
-          <a:p>
-            <a:r>
-              <a:rPr lang="en-US" dirty="0" smtClean="0">
-                <a:solidFill>
-                  <a:schemeClr val="bg1">
-                    <a:lumMod val="65000"/>
-                  </a:schemeClr>
-                </a:solidFill>
-              </a:rPr>
-              <a:t>Agenda</a:t>
-            </a:r>
-            <a:endParaRPr lang="en-US" dirty="0">
-              <a:solidFill>
-                <a:schemeClr val="bg1">
-                  <a:lumMod val="65000"/>
-                </a:schemeClr>
-              </a:solidFill>
-            </a:endParaRPr>
-          </a:p>
-        </p:txBody>
-      </p:sp>
-      <p:sp>
-        <p:nvSpPr>
-          <p:cNvPr id="3" name="Content Placeholder 2"/>
-          <p:cNvSpPr>
-            <a:spLocks noGrp="1"/>
-          </p:cNvSpPr>
-          <p:nvPr>
-            <p:ph idx="1"/>
-          </p:nvPr>
-        </p:nvSpPr>
-        <p:spPr/>
-        <p:txBody>
-          <a:bodyPr>
-            <a:normAutofit lnSpcReduction="10000"/>
+      </p:pic>
+      <p:sp>
+        <p:nvSpPr>
+          <p:cNvPr id="2" name="Rectangle 1"/>
+          <p:cNvSpPr/>
+          <p:nvPr/>
+        </p:nvSpPr>
+        <p:spPr>
+          <a:xfrm>
+            <a:off x="1252886" y="6566546"/>
+            <a:ext cx="6642373" cy="215444"/>
+          </a:xfrm>
+          <a:prstGeom prst="rect">
+            <a:avLst/>
+          </a:prstGeom>
+        </p:spPr>
+        <p:txBody>
+          <a:bodyPr wrap="square">
+            <a:spAutoFit/>
           </a:bodyPr>
           <a:lstStyle/>
           <a:p>
-            <a:pPr marL="0" indent="0">
-              <a:buNone/>
-            </a:pPr>
-            <a:r>
-              <a:rPr lang="en-US" b="1" dirty="0" smtClean="0"/>
-              <a:t>The Context of Research Data Curation</a:t>
-            </a:r>
-          </a:p>
-          <a:p>
-            <a:pPr lvl="1">
-              <a:buFontTx/>
-              <a:buChar char="-"/>
-            </a:pPr>
-            <a:r>
-              <a:rPr lang="en-US" dirty="0" smtClean="0"/>
-              <a:t>Economic Investment in Public Goods</a:t>
-            </a:r>
-          </a:p>
-          <a:p>
-            <a:pPr lvl="1">
-              <a:buFontTx/>
-              <a:buChar char="-"/>
-            </a:pPr>
-            <a:r>
-              <a:rPr lang="en-US" dirty="0" smtClean="0"/>
-              <a:t>Reproducibility of New Knowledge</a:t>
-            </a:r>
-          </a:p>
-          <a:p>
-            <a:pPr marL="0" indent="0">
-              <a:buNone/>
-            </a:pPr>
-            <a:r>
-              <a:rPr lang="en-US" b="1" dirty="0" smtClean="0"/>
-              <a:t>Open Data</a:t>
-            </a:r>
-          </a:p>
-          <a:p>
-            <a:pPr lvl="1">
-              <a:buFontTx/>
-              <a:buChar char="-"/>
-            </a:pPr>
-            <a:r>
-              <a:rPr lang="en-US" dirty="0" smtClean="0"/>
-              <a:t>Government + Commercial Sector</a:t>
-            </a:r>
-          </a:p>
-          <a:p>
-            <a:pPr lvl="1">
-              <a:buFontTx/>
-              <a:buChar char="-"/>
-            </a:pPr>
-            <a:r>
-              <a:rPr lang="en-US" dirty="0" smtClean="0"/>
-              <a:t>Research + Higher Education</a:t>
-            </a:r>
-          </a:p>
-          <a:p>
-            <a:pPr marL="0" indent="0">
-              <a:buNone/>
-            </a:pPr>
-            <a:r>
-              <a:rPr lang="en-US" b="1" dirty="0" smtClean="0"/>
-              <a:t>Scholarly Communications</a:t>
-            </a:r>
-          </a:p>
-          <a:p>
-            <a:pPr lvl="1">
-              <a:buFontTx/>
-              <a:buChar char="-"/>
-            </a:pPr>
-            <a:r>
-              <a:rPr lang="en-US" dirty="0" smtClean="0"/>
-              <a:t>Decoupling the scholarly record</a:t>
-            </a:r>
-          </a:p>
-          <a:p>
-            <a:pPr lvl="1">
-              <a:buFontTx/>
-              <a:buChar char="-"/>
-            </a:pPr>
-            <a:r>
-              <a:rPr lang="en-US" dirty="0" smtClean="0"/>
-              <a:t>Research Objects as first-class scholarly products  </a:t>
-            </a:r>
-            <a:endParaRPr lang="en-US" dirty="0"/>
+            <a:r>
+              <a:rPr lang="en-US" sz="800" dirty="0"/>
+              <a:t>http://</a:t>
+            </a:r>
+            <a:r>
+              <a:rPr lang="en-US" sz="800" dirty="0" err="1"/>
+              <a:t>opensource.com</a:t>
+            </a:r>
+            <a:r>
+              <a:rPr lang="en-US" sz="800" dirty="0"/>
+              <a:t>/sites/default/files/styles/image-full-size/public/images/government/</a:t>
+            </a:r>
+            <a:r>
+              <a:rPr lang="en-US" sz="800" dirty="0" err="1"/>
+              <a:t>OSCD_GOV_open_data_standards.png?itok</a:t>
+            </a:r>
+            <a:r>
+              <a:rPr lang="en-US" sz="800" dirty="0"/>
+              <a:t>=igpITdY0</a:t>
+            </a:r>
           </a:p>
         </p:txBody>
       </p:sp>
     </p:spTree>
     <p:extLst>
       <p:ext uri="{BB962C8B-B14F-4D97-AF65-F5344CB8AC3E}">
-        <p14:creationId xmlns:p14="http://schemas.microsoft.com/office/powerpoint/2010/main" val="1970159385"/>
+        <p14:creationId xmlns:p14="http://schemas.microsoft.com/office/powerpoint/2010/main" val="2537751626"/>
       </p:ext>
     </p:extLst>
   </p:cSld>
@@ -4197,7 +4219,7 @@
         </p:nvSpPr>
         <p:spPr>
           <a:xfrm>
-            <a:off x="457200" y="3117824"/>
+            <a:off x="352941" y="274638"/>
             <a:ext cx="8229600" cy="1143000"/>
           </a:xfrm>
         </p:spPr>
@@ -4206,8 +4228,126 @@
           <a:lstStyle/>
           <a:p>
             <a:r>
+              <a:rPr lang="en-US" dirty="0" smtClean="0">
+                <a:solidFill>
+                  <a:schemeClr val="bg1">
+                    <a:lumMod val="65000"/>
+                  </a:schemeClr>
+                </a:solidFill>
+              </a:rPr>
+              <a:t>Agenda</a:t>
+            </a:r>
+            <a:endParaRPr lang="en-US" dirty="0">
+              <a:solidFill>
+                <a:schemeClr val="bg1">
+                  <a:lumMod val="65000"/>
+                </a:schemeClr>
+              </a:solidFill>
+            </a:endParaRPr>
+          </a:p>
+        </p:txBody>
+      </p:sp>
+      <p:sp>
+        <p:nvSpPr>
+          <p:cNvPr id="3" name="Content Placeholder 2"/>
+          <p:cNvSpPr>
+            <a:spLocks noGrp="1"/>
+          </p:cNvSpPr>
+          <p:nvPr>
+            <p:ph idx="1"/>
+          </p:nvPr>
+        </p:nvSpPr>
+        <p:spPr/>
+        <p:txBody>
+          <a:bodyPr>
+            <a:normAutofit lnSpcReduction="10000"/>
+          </a:bodyPr>
+          <a:lstStyle/>
+          <a:p>
+            <a:pPr marL="0" indent="0">
+              <a:buNone/>
+            </a:pPr>
+            <a:r>
+              <a:rPr lang="en-US" b="1" dirty="0" smtClean="0"/>
+              <a:t>The Context of Research Data Curation</a:t>
+            </a:r>
+          </a:p>
+          <a:p>
+            <a:pPr lvl="1">
+              <a:buFontTx/>
+              <a:buChar char="-"/>
+            </a:pPr>
+            <a:r>
               <a:rPr lang="en-US" dirty="0" smtClean="0"/>
-              <a:t>2 Quick Examples</a:t>
+              <a:t>Economic Investment in Public Goods</a:t>
+            </a:r>
+          </a:p>
+          <a:p>
+            <a:pPr lvl="1">
+              <a:buFontTx/>
+              <a:buChar char="-"/>
+            </a:pPr>
+            <a:r>
+              <a:rPr lang="en-US" dirty="0" smtClean="0"/>
+              <a:t>Reproducibility of New Knowledge</a:t>
+            </a:r>
+          </a:p>
+          <a:p>
+            <a:pPr marL="0" indent="0">
+              <a:buNone/>
+            </a:pPr>
+            <a:r>
+              <a:rPr lang="en-US" b="1" dirty="0" smtClean="0"/>
+              <a:t>Open Data</a:t>
+            </a:r>
+          </a:p>
+          <a:p>
+            <a:pPr lvl="1">
+              <a:buFontTx/>
+              <a:buChar char="-"/>
+            </a:pPr>
+            <a:r>
+              <a:rPr lang="en-US" dirty="0" smtClean="0"/>
+              <a:t>Government + Commercial Sector</a:t>
+            </a:r>
+          </a:p>
+          <a:p>
+            <a:pPr lvl="1">
+              <a:buFontTx/>
+              <a:buChar char="-"/>
+            </a:pPr>
+            <a:r>
+              <a:rPr lang="en-US" dirty="0" smtClean="0"/>
+              <a:t>Research + Higher Education</a:t>
+            </a:r>
+          </a:p>
+          <a:p>
+            <a:pPr marL="0" indent="0">
+              <a:buNone/>
+            </a:pPr>
+            <a:r>
+              <a:rPr lang="en-US" b="1" dirty="0" smtClean="0"/>
+              <a:t>Scholarly Communications</a:t>
+            </a:r>
+          </a:p>
+          <a:p>
+            <a:pPr lvl="1">
+              <a:buFontTx/>
+              <a:buChar char="-"/>
+            </a:pPr>
+            <a:r>
+              <a:rPr lang="en-US" dirty="0" smtClean="0"/>
+              <a:t>Decoupling the scholarly record</a:t>
+            </a:r>
+          </a:p>
+          <a:p>
+            <a:pPr lvl="1">
+              <a:buFontTx/>
+              <a:buChar char="-"/>
+            </a:pPr>
+            <a:r>
+              <a:rPr lang="en-US" dirty="0" smtClean="0"/>
+              <a:t>Research Objects as first-class scholarly products  </a:t>
             </a:r>
             <a:endParaRPr lang="en-US" dirty="0"/>
           </a:p>
@@ -4216,7 +4356,7 @@
     </p:spTree>
     <p:extLst>
       <p:ext uri="{BB962C8B-B14F-4D97-AF65-F5344CB8AC3E}">
-        <p14:creationId xmlns:p14="http://schemas.microsoft.com/office/powerpoint/2010/main" val="2668410991"/>
+        <p14:creationId xmlns:p14="http://schemas.microsoft.com/office/powerpoint/2010/main" val="1970159385"/>
       </p:ext>
     </p:extLst>
   </p:cSld>
@@ -4260,6 +4400,64 @@
           </a:xfrm>
         </p:spPr>
         <p:txBody>
+          <a:bodyPr/>
+          <a:lstStyle/>
+          <a:p>
+            <a:r>
+              <a:rPr lang="en-US" dirty="0" smtClean="0"/>
+              <a:t>2 Quick Examples</a:t>
+            </a:r>
+            <a:endParaRPr lang="en-US" dirty="0"/>
+          </a:p>
+        </p:txBody>
+      </p:sp>
+    </p:spTree>
+    <p:extLst>
+      <p:ext uri="{BB962C8B-B14F-4D97-AF65-F5344CB8AC3E}">
+        <p14:creationId xmlns:p14="http://schemas.microsoft.com/office/powerpoint/2010/main" val="2668410991"/>
+      </p:ext>
+    </p:extLst>
+  </p:cSld>
+  <p:clrMapOvr>
+    <a:masterClrMapping/>
+  </p:clrMapOvr>
+</p:sld>
+</file>
+
+<file path=ppt/slides/slide14.xml><?xml version="1.0" encoding="utf-8"?>
+<p:sld xmlns:a="http://schemas.openxmlformats.org/drawingml/2006/main" xmlns:r="http://schemas.openxmlformats.org/officeDocument/2006/relationships" xmlns:p="http://schemas.openxmlformats.org/presentationml/2006/main">
+  <p:cSld>
+    <p:spTree>
+      <p:nvGrpSpPr>
+        <p:cNvPr id="1" name=""/>
+        <p:cNvGrpSpPr/>
+        <p:nvPr/>
+      </p:nvGrpSpPr>
+      <p:grpSpPr>
+        <a:xfrm>
+          <a:off x="0" y="0"/>
+          <a:ext cx="0" cy="0"/>
+          <a:chOff x="0" y="0"/>
+          <a:chExt cx="0" cy="0"/>
+        </a:xfrm>
+      </p:grpSpPr>
+      <p:sp>
+        <p:nvSpPr>
+          <p:cNvPr id="2" name="Title 1"/>
+          <p:cNvSpPr>
+            <a:spLocks noGrp="1"/>
+          </p:cNvSpPr>
+          <p:nvPr>
+            <p:ph type="title"/>
+          </p:nvPr>
+        </p:nvSpPr>
+        <p:spPr>
+          <a:xfrm>
+            <a:off x="457200" y="3117824"/>
+            <a:ext cx="8229600" cy="1143000"/>
+          </a:xfrm>
+        </p:spPr>
+        <p:txBody>
           <a:bodyPr>
             <a:normAutofit fontScale="90000"/>
           </a:bodyPr>
@@ -4294,7 +4492,7 @@
 </p:sld>
 </file>
 
-<file path=ppt/slides/slide14.xml><?xml version="1.0" encoding="utf-8"?>
+<file path=ppt/slides/slide15.xml><?xml version="1.0" encoding="utf-8"?>
 <p:sld xmlns:a="http://schemas.openxmlformats.org/drawingml/2006/main" xmlns:r="http://schemas.openxmlformats.org/officeDocument/2006/relationships" xmlns:p="http://schemas.openxmlformats.org/presentationml/2006/main">
   <p:cSld>
     <p:spTree>
@@ -4541,96 +4739,6 @@
 </p:sld>
 </file>
 
-<file path=ppt/slides/slide15.xml><?xml version="1.0" encoding="utf-8"?>
-<p:sld xmlns:a="http://schemas.openxmlformats.org/drawingml/2006/main" xmlns:r="http://schemas.openxmlformats.org/officeDocument/2006/relationships" xmlns:p="http://schemas.openxmlformats.org/presentationml/2006/main">
-  <p:cSld>
-    <p:spTree>
-      <p:nvGrpSpPr>
-        <p:cNvPr id="1" name=""/>
-        <p:cNvGrpSpPr/>
-        <p:nvPr/>
-      </p:nvGrpSpPr>
-      <p:grpSpPr>
-        <a:xfrm>
-          <a:off x="0" y="0"/>
-          <a:ext cx="0" cy="0"/>
-          <a:chOff x="0" y="0"/>
-          <a:chExt cx="0" cy="0"/>
-        </a:xfrm>
-      </p:grpSpPr>
-      <p:sp>
-        <p:nvSpPr>
-          <p:cNvPr id="2" name="Title 1"/>
-          <p:cNvSpPr>
-            <a:spLocks noGrp="1"/>
-          </p:cNvSpPr>
-          <p:nvPr>
-            <p:ph type="title"/>
-          </p:nvPr>
-        </p:nvSpPr>
-        <p:spPr/>
-        <p:txBody>
-          <a:bodyPr/>
-          <a:lstStyle/>
-          <a:p>
-            <a:endParaRPr lang="en-US"/>
-          </a:p>
-        </p:txBody>
-      </p:sp>
-      <p:sp>
-        <p:nvSpPr>
-          <p:cNvPr id="3" name="Content Placeholder 2"/>
-          <p:cNvSpPr>
-            <a:spLocks noGrp="1"/>
-          </p:cNvSpPr>
-          <p:nvPr>
-            <p:ph idx="1"/>
-          </p:nvPr>
-        </p:nvSpPr>
-        <p:spPr/>
-        <p:txBody>
-          <a:bodyPr/>
-          <a:lstStyle/>
-          <a:p>
-            <a:pPr marL="0" indent="0">
-              <a:buNone/>
-            </a:pPr>
-            <a:r>
-              <a:rPr lang="en-US" dirty="0" smtClean="0"/>
-              <a:t>Cost including salary: $2948 </a:t>
-            </a:r>
-          </a:p>
-          <a:p>
-            <a:pPr marL="0" indent="0">
-              <a:buNone/>
-            </a:pPr>
-            <a:endParaRPr lang="en-US" dirty="0"/>
-          </a:p>
-          <a:p>
-            <a:pPr marL="0" indent="0">
-              <a:buNone/>
-            </a:pPr>
-            <a:r>
-              <a:rPr lang="en-US" dirty="0" smtClean="0"/>
-              <a:t>Opportunity cost… enormous. </a:t>
-            </a:r>
-            <a:endParaRPr lang="en-US" dirty="0"/>
-          </a:p>
-        </p:txBody>
-      </p:sp>
-    </p:spTree>
-    <p:extLst>
-      <p:ext uri="{BB962C8B-B14F-4D97-AF65-F5344CB8AC3E}">
-        <p14:creationId xmlns:p14="http://schemas.microsoft.com/office/powerpoint/2010/main" val="700443825"/>
-      </p:ext>
-    </p:extLst>
-  </p:cSld>
-  <p:clrMapOvr>
-    <a:masterClrMapping/>
-  </p:clrMapOvr>
-</p:sld>
-</file>
-
 <file path=ppt/slides/slide16.xml><?xml version="1.0" encoding="utf-8"?>
 <p:sld xmlns:a="http://schemas.openxmlformats.org/drawingml/2006/main" xmlns:r="http://schemas.openxmlformats.org/officeDocument/2006/relationships" xmlns:p="http://schemas.openxmlformats.org/presentationml/2006/main">
   <p:cSld>
@@ -4663,6 +4771,122 @@
           <a:bodyPr/>
           <a:lstStyle/>
           <a:p>
+            <a:endParaRPr lang="en-US"/>
+          </a:p>
+        </p:txBody>
+      </p:sp>
+      <p:sp>
+        <p:nvSpPr>
+          <p:cNvPr id="3" name="Content Placeholder 2"/>
+          <p:cNvSpPr>
+            <a:spLocks noGrp="1"/>
+          </p:cNvSpPr>
+          <p:nvPr>
+            <p:ph idx="1"/>
+          </p:nvPr>
+        </p:nvSpPr>
+        <p:spPr/>
+        <p:txBody>
+          <a:bodyPr/>
+          <a:lstStyle/>
+          <a:p>
+            <a:pPr marL="0" indent="0">
+              <a:buNone/>
+            </a:pPr>
+            <a:r>
+              <a:rPr lang="en-US" dirty="0" smtClean="0"/>
+              <a:t>Cost including salary: $</a:t>
+            </a:r>
+            <a:r>
+              <a:rPr lang="en-US" dirty="0" smtClean="0"/>
+              <a:t>2948</a:t>
+            </a:r>
+          </a:p>
+          <a:p>
+            <a:pPr marL="0" indent="0">
+              <a:buNone/>
+            </a:pPr>
+            <a:r>
+              <a:rPr lang="en-US" dirty="0" smtClean="0"/>
+              <a:t>Cost including publication in Open Access journal: $ 3000</a:t>
+            </a:r>
+            <a:r>
+              <a:rPr lang="en-US" dirty="0" smtClean="0"/>
+              <a:t> </a:t>
+            </a:r>
+            <a:endParaRPr lang="en-US" dirty="0" smtClean="0"/>
+          </a:p>
+          <a:p>
+            <a:pPr marL="0" indent="0">
+              <a:buNone/>
+            </a:pPr>
+            <a:endParaRPr lang="en-US" dirty="0"/>
+          </a:p>
+          <a:p>
+            <a:pPr marL="0" indent="0">
+              <a:buNone/>
+            </a:pPr>
+            <a:r>
+              <a:rPr lang="en-US" dirty="0" smtClean="0"/>
+              <a:t>But, the </a:t>
+            </a:r>
+            <a:r>
+              <a:rPr lang="en-US" dirty="0" err="1" smtClean="0"/>
+              <a:t>pportunity</a:t>
+            </a:r>
+            <a:r>
+              <a:rPr lang="en-US" dirty="0" smtClean="0"/>
+              <a:t> cost of doing things differently…</a:t>
+            </a:r>
+            <a:endParaRPr lang="en-US" dirty="0"/>
+          </a:p>
+        </p:txBody>
+      </p:sp>
+    </p:spTree>
+    <p:extLst>
+      <p:ext uri="{BB962C8B-B14F-4D97-AF65-F5344CB8AC3E}">
+        <p14:creationId xmlns:p14="http://schemas.microsoft.com/office/powerpoint/2010/main" val="700443825"/>
+      </p:ext>
+    </p:extLst>
+  </p:cSld>
+  <p:clrMapOvr>
+    <a:masterClrMapping/>
+  </p:clrMapOvr>
+</p:sld>
+</file>
+
+<file path=ppt/slides/slide17.xml><?xml version="1.0" encoding="utf-8"?>
+<p:sld xmlns:a="http://schemas.openxmlformats.org/drawingml/2006/main" xmlns:r="http://schemas.openxmlformats.org/officeDocument/2006/relationships" xmlns:p="http://schemas.openxmlformats.org/presentationml/2006/main">
+  <p:cSld>
+    <p:spTree>
+      <p:nvGrpSpPr>
+        <p:cNvPr id="1" name=""/>
+        <p:cNvGrpSpPr/>
+        <p:nvPr/>
+      </p:nvGrpSpPr>
+      <p:grpSpPr>
+        <a:xfrm>
+          <a:off x="0" y="0"/>
+          <a:ext cx="0" cy="0"/>
+          <a:chOff x="0" y="0"/>
+          <a:chExt cx="0" cy="0"/>
+        </a:xfrm>
+      </p:grpSpPr>
+      <p:sp>
+        <p:nvSpPr>
+          <p:cNvPr id="2" name="Title 1"/>
+          <p:cNvSpPr>
+            <a:spLocks noGrp="1"/>
+          </p:cNvSpPr>
+          <p:nvPr>
+            <p:ph type="title"/>
+          </p:nvPr>
+        </p:nvSpPr>
+        <p:spPr/>
+        <p:txBody>
+          <a:bodyPr/>
+          <a:lstStyle/>
+          <a:p>
             <a:r>
               <a:rPr lang="en-US" dirty="0" smtClean="0"/>
               <a:t>Crisis? What Crisis? </a:t>
@@ -4720,7 +4944,7 @@
 </p:sld>
 </file>
 
-<file path=ppt/slides/slide17.xml><?xml version="1.0" encoding="utf-8"?>
+<file path=ppt/slides/slide18.xml><?xml version="1.0" encoding="utf-8"?>
 <p:sld xmlns:a="http://schemas.openxmlformats.org/drawingml/2006/main" xmlns:r="http://schemas.openxmlformats.org/officeDocument/2006/relationships" xmlns:p="http://schemas.openxmlformats.org/presentationml/2006/main">
   <p:cSld>
     <p:spTree>
@@ -4884,7 +5108,7 @@
 </p:sld>
 </file>
 
-<file path=ppt/slides/slide18.xml><?xml version="1.0" encoding="utf-8"?>
+<file path=ppt/slides/slide19.xml><?xml version="1.0" encoding="utf-8"?>
 <p:sld xmlns:a="http://schemas.openxmlformats.org/drawingml/2006/main" xmlns:r="http://schemas.openxmlformats.org/officeDocument/2006/relationships" xmlns:p="http://schemas.openxmlformats.org/presentationml/2006/main">
   <p:cSld>
     <p:spTree>
@@ -4958,94 +5182,6 @@
     <p:extLst>
       <p:ext uri="{BB962C8B-B14F-4D97-AF65-F5344CB8AC3E}">
         <p14:creationId xmlns:p14="http://schemas.microsoft.com/office/powerpoint/2010/main" val="2046544117"/>
-      </p:ext>
-    </p:extLst>
-  </p:cSld>
-  <p:clrMapOvr>
-    <a:masterClrMapping/>
-  </p:clrMapOvr>
-</p:sld>
-</file>
-
-<file path=ppt/slides/slide19.xml><?xml version="1.0" encoding="utf-8"?>
-<p:sld xmlns:a="http://schemas.openxmlformats.org/drawingml/2006/main" xmlns:r="http://schemas.openxmlformats.org/officeDocument/2006/relationships" xmlns:p="http://schemas.openxmlformats.org/presentationml/2006/main">
-  <p:cSld>
-    <p:spTree>
-      <p:nvGrpSpPr>
-        <p:cNvPr id="1" name=""/>
-        <p:cNvGrpSpPr/>
-        <p:nvPr/>
-      </p:nvGrpSpPr>
-      <p:grpSpPr>
-        <a:xfrm>
-          <a:off x="0" y="0"/>
-          <a:ext cx="0" cy="0"/>
-          <a:chOff x="0" y="0"/>
-          <a:chExt cx="0" cy="0"/>
-        </a:xfrm>
-      </p:grpSpPr>
-      <p:pic>
-        <p:nvPicPr>
-          <p:cNvPr id="2" name="Picture 1" descr="Screen Shot 2015-01-07 at 4.19.10 PM.png"/>
-          <p:cNvPicPr>
-            <a:picLocks noChangeAspect="1"/>
-          </p:cNvPicPr>
-          <p:nvPr/>
-        </p:nvPicPr>
-        <p:blipFill>
-          <a:blip r:embed="rId2">
-            <a:extLst>
-              <a:ext uri="{28A0092B-C50C-407E-A947-70E740481C1C}">
-                <a14:useLocalDpi xmlns:a14="http://schemas.microsoft.com/office/drawing/2010/main" val="0"/>
-              </a:ext>
-            </a:extLst>
-          </a:blip>
-          <a:stretch>
-            <a:fillRect/>
-          </a:stretch>
-        </p:blipFill>
-        <p:spPr>
-          <a:xfrm>
-            <a:off x="102188" y="846757"/>
-            <a:ext cx="8892273" cy="4417228"/>
-          </a:xfrm>
-          <a:prstGeom prst="rect">
-            <a:avLst/>
-          </a:prstGeom>
-        </p:spPr>
-      </p:pic>
-      <p:sp>
-        <p:nvSpPr>
-          <p:cNvPr id="3" name="Rectangle 2"/>
-          <p:cNvSpPr/>
-          <p:nvPr/>
-        </p:nvSpPr>
-        <p:spPr>
-          <a:xfrm>
-            <a:off x="3460157" y="6091189"/>
-            <a:ext cx="2223686" cy="369332"/>
-          </a:xfrm>
-          <a:prstGeom prst="rect">
-            <a:avLst/>
-          </a:prstGeom>
-        </p:spPr>
-        <p:txBody>
-          <a:bodyPr wrap="none">
-            <a:spAutoFit/>
-          </a:bodyPr>
-          <a:lstStyle/>
-          <a:p>
-            <a:r>
-              <a:rPr lang="en-US" dirty="0"/>
-              <a:t>http://5stardata.info/</a:t>
-            </a:r>
-          </a:p>
-        </p:txBody>
-      </p:sp>
-    </p:spTree>
-    <p:extLst>
-      <p:ext uri="{BB962C8B-B14F-4D97-AF65-F5344CB8AC3E}">
-        <p14:creationId xmlns:p14="http://schemas.microsoft.com/office/powerpoint/2010/main" val="3821362691"/>
       </p:ext>
     </p:extLst>
   </p:cSld>
@@ -5203,6 +5339,94 @@
 </file>
 
 <file path=ppt/slides/slide20.xml><?xml version="1.0" encoding="utf-8"?>
+<p:sld xmlns:a="http://schemas.openxmlformats.org/drawingml/2006/main" xmlns:r="http://schemas.openxmlformats.org/officeDocument/2006/relationships" xmlns:p="http://schemas.openxmlformats.org/presentationml/2006/main">
+  <p:cSld>
+    <p:spTree>
+      <p:nvGrpSpPr>
+        <p:cNvPr id="1" name=""/>
+        <p:cNvGrpSpPr/>
+        <p:nvPr/>
+      </p:nvGrpSpPr>
+      <p:grpSpPr>
+        <a:xfrm>
+          <a:off x="0" y="0"/>
+          <a:ext cx="0" cy="0"/>
+          <a:chOff x="0" y="0"/>
+          <a:chExt cx="0" cy="0"/>
+        </a:xfrm>
+      </p:grpSpPr>
+      <p:pic>
+        <p:nvPicPr>
+          <p:cNvPr id="2" name="Picture 1" descr="Screen Shot 2015-01-07 at 4.19.10 PM.png"/>
+          <p:cNvPicPr>
+            <a:picLocks noChangeAspect="1"/>
+          </p:cNvPicPr>
+          <p:nvPr/>
+        </p:nvPicPr>
+        <p:blipFill>
+          <a:blip r:embed="rId2">
+            <a:extLst>
+              <a:ext uri="{28A0092B-C50C-407E-A947-70E740481C1C}">
+                <a14:useLocalDpi xmlns:a14="http://schemas.microsoft.com/office/drawing/2010/main" val="0"/>
+              </a:ext>
+            </a:extLst>
+          </a:blip>
+          <a:stretch>
+            <a:fillRect/>
+          </a:stretch>
+        </p:blipFill>
+        <p:spPr>
+          <a:xfrm>
+            <a:off x="102188" y="846757"/>
+            <a:ext cx="8892273" cy="4417228"/>
+          </a:xfrm>
+          <a:prstGeom prst="rect">
+            <a:avLst/>
+          </a:prstGeom>
+        </p:spPr>
+      </p:pic>
+      <p:sp>
+        <p:nvSpPr>
+          <p:cNvPr id="3" name="Rectangle 2"/>
+          <p:cNvSpPr/>
+          <p:nvPr/>
+        </p:nvSpPr>
+        <p:spPr>
+          <a:xfrm>
+            <a:off x="3460157" y="6091189"/>
+            <a:ext cx="2223686" cy="369332"/>
+          </a:xfrm>
+          <a:prstGeom prst="rect">
+            <a:avLst/>
+          </a:prstGeom>
+        </p:spPr>
+        <p:txBody>
+          <a:bodyPr wrap="none">
+            <a:spAutoFit/>
+          </a:bodyPr>
+          <a:lstStyle/>
+          <a:p>
+            <a:r>
+              <a:rPr lang="en-US" dirty="0"/>
+              <a:t>http://5stardata.info/</a:t>
+            </a:r>
+          </a:p>
+        </p:txBody>
+      </p:sp>
+    </p:spTree>
+    <p:extLst>
+      <p:ext uri="{BB962C8B-B14F-4D97-AF65-F5344CB8AC3E}">
+        <p14:creationId xmlns:p14="http://schemas.microsoft.com/office/powerpoint/2010/main" val="3821362691"/>
+      </p:ext>
+    </p:extLst>
+  </p:cSld>
+  <p:clrMapOvr>
+    <a:masterClrMapping/>
+  </p:clrMapOvr>
+</p:sld>
+</file>
+
+<file path=ppt/slides/slide21.xml><?xml version="1.0" encoding="utf-8"?>
 <p:sld xmlns:a="http://schemas.openxmlformats.org/drawingml/2006/main" xmlns:r="http://schemas.openxmlformats.org/officeDocument/2006/relationships" xmlns:p="http://schemas.openxmlformats.org/presentationml/2006/main">
   <p:cSld>
     <p:spTree>
@@ -5639,6 +5863,66 @@
       </p:grpSpPr>
       <p:pic>
         <p:nvPicPr>
+          <p:cNvPr id="5" name="Picture 4" descr="Screen Shot 2015-02-08 at 4.39.05 PM.png"/>
+          <p:cNvPicPr>
+            <a:picLocks noChangeAspect="1"/>
+          </p:cNvPicPr>
+          <p:nvPr/>
+        </p:nvPicPr>
+        <p:blipFill>
+          <a:blip r:embed="rId3">
+            <a:extLst>
+              <a:ext uri="{28A0092B-C50C-407E-A947-70E740481C1C}">
+                <a14:useLocalDpi xmlns:a14="http://schemas.microsoft.com/office/drawing/2010/main" val="0"/>
+              </a:ext>
+            </a:extLst>
+          </a:blip>
+          <a:stretch>
+            <a:fillRect/>
+          </a:stretch>
+        </p:blipFill>
+        <p:spPr>
+          <a:xfrm>
+            <a:off x="579288" y="614516"/>
+            <a:ext cx="6526157" cy="4884789"/>
+          </a:xfrm>
+          <a:prstGeom prst="rect">
+            <a:avLst/>
+          </a:prstGeom>
+        </p:spPr>
+      </p:pic>
+    </p:spTree>
+    <p:extLst>
+      <p:ext uri="{BB962C8B-B14F-4D97-AF65-F5344CB8AC3E}">
+        <p14:creationId xmlns:p14="http://schemas.microsoft.com/office/powerpoint/2010/main" val="1045491306"/>
+      </p:ext>
+    </p:extLst>
+  </p:cSld>
+  <p:clrMapOvr>
+    <a:masterClrMapping/>
+  </p:clrMapOvr>
+</p:sld>
+</file>
+
+<file path=ppt/slides/slide7.xml><?xml version="1.0" encoding="utf-8"?>
+<p:sld xmlns:a="http://schemas.openxmlformats.org/drawingml/2006/main" xmlns:r="http://schemas.openxmlformats.org/officeDocument/2006/relationships" xmlns:p="http://schemas.openxmlformats.org/presentationml/2006/main">
+  <p:cSld>
+    <p:spTree>
+      <p:nvGrpSpPr>
+        <p:cNvPr id="1" name=""/>
+        <p:cNvGrpSpPr/>
+        <p:nvPr/>
+      </p:nvGrpSpPr>
+      <p:grpSpPr>
+        <a:xfrm>
+          <a:off x="0" y="0"/>
+          <a:ext cx="0" cy="0"/>
+          <a:chOff x="0" y="0"/>
+          <a:chExt cx="0" cy="0"/>
+        </a:xfrm>
+      </p:grpSpPr>
+      <p:pic>
+        <p:nvPicPr>
           <p:cNvPr id="2" name="Picture 1" descr="Screen Shot 2015-01-19 at 9.28.07 AM.png"/>
           <p:cNvPicPr>
             <a:picLocks noChangeAspect="1"/>
@@ -5680,93 +5964,6 @@
 </p:sld>
 </file>
 
-<file path=ppt/slides/slide7.xml><?xml version="1.0" encoding="utf-8"?>
-<p:sld xmlns:a="http://schemas.openxmlformats.org/drawingml/2006/main" xmlns:r="http://schemas.openxmlformats.org/officeDocument/2006/relationships" xmlns:p="http://schemas.openxmlformats.org/presentationml/2006/main">
-  <p:cSld>
-    <p:spTree>
-      <p:nvGrpSpPr>
-        <p:cNvPr id="1" name=""/>
-        <p:cNvGrpSpPr/>
-        <p:nvPr/>
-      </p:nvGrpSpPr>
-      <p:grpSpPr>
-        <a:xfrm>
-          <a:off x="0" y="0"/>
-          <a:ext cx="0" cy="0"/>
-          <a:chOff x="0" y="0"/>
-          <a:chExt cx="0" cy="0"/>
-        </a:xfrm>
-      </p:grpSpPr>
-      <p:sp>
-        <p:nvSpPr>
-          <p:cNvPr id="2" name="TextBox 1"/>
-          <p:cNvSpPr txBox="1"/>
-          <p:nvPr/>
-        </p:nvSpPr>
-        <p:spPr>
-          <a:xfrm>
-            <a:off x="4051125" y="2994436"/>
-            <a:ext cx="10088030" cy="369332"/>
-          </a:xfrm>
-          <a:prstGeom prst="rect">
-            <a:avLst/>
-          </a:prstGeom>
-          <a:noFill/>
-        </p:spPr>
-        <p:txBody>
-          <a:bodyPr wrap="none" rtlCol="0">
-            <a:spAutoFit/>
-          </a:bodyPr>
-          <a:lstStyle/>
-          <a:p>
-            <a:r>
-              <a:rPr lang="en-US" dirty="0" smtClean="0"/>
-              <a:t>Find </a:t>
-            </a:r>
-            <a:r>
-              <a:rPr lang="en-US" dirty="0"/>
-              <a:t>something from here: http://</a:t>
-            </a:r>
-            <a:r>
-              <a:rPr lang="en-US" dirty="0" err="1"/>
-              <a:t>journals.plos.org</a:t>
-            </a:r>
-            <a:r>
-              <a:rPr lang="en-US" dirty="0"/>
-              <a:t>/</a:t>
-            </a:r>
-            <a:r>
-              <a:rPr lang="en-US" dirty="0" err="1"/>
-              <a:t>plosone</a:t>
-            </a:r>
-            <a:r>
-              <a:rPr lang="en-US" dirty="0"/>
-              <a:t>/</a:t>
-            </a:r>
-            <a:r>
-              <a:rPr lang="en-US" dirty="0" err="1"/>
-              <a:t>article?id</a:t>
-            </a:r>
-            <a:r>
-              <a:rPr lang="en-US" dirty="0"/>
-              <a:t>=10.1371/journal.pone.0108451#s5</a:t>
-            </a:r>
-          </a:p>
-        </p:txBody>
-      </p:sp>
-    </p:spTree>
-    <p:extLst>
-      <p:ext uri="{BB962C8B-B14F-4D97-AF65-F5344CB8AC3E}">
-        <p14:creationId xmlns:p14="http://schemas.microsoft.com/office/powerpoint/2010/main" val="2126266482"/>
-      </p:ext>
-    </p:extLst>
-  </p:cSld>
-  <p:clrMapOvr>
-    <a:masterClrMapping/>
-  </p:clrMapOvr>
-</p:sld>
-</file>
-
 <file path=ppt/slides/slide8.xml><?xml version="1.0" encoding="utf-8"?>
 <p:sld xmlns:a="http://schemas.openxmlformats.org/drawingml/2006/main" xmlns:r="http://schemas.openxmlformats.org/officeDocument/2006/relationships" xmlns:p="http://schemas.openxmlformats.org/presentationml/2006/main">
   <p:cSld>
@@ -5792,8 +5989,8 @@
         </p:nvSpPr>
         <p:spPr>
           <a:xfrm>
-            <a:off x="2484443" y="3643385"/>
-            <a:ext cx="9226467" cy="369332"/>
+            <a:off x="4051125" y="2994436"/>
+            <a:ext cx="10088030" cy="369332"/>
           </a:xfrm>
           <a:prstGeom prst="rect">
             <a:avLst/>
@@ -5807,8 +6004,12 @@
           <a:lstStyle/>
           <a:p>
             <a:r>
+              <a:rPr lang="en-US" dirty="0" smtClean="0"/>
+              <a:t>Find </a:t>
+            </a:r>
+            <a:r>
               <a:rPr lang="en-US" dirty="0"/>
-              <a:t>http://</a:t>
+              <a:t>something from here: http://</a:t>
             </a:r>
             <a:r>
               <a:rPr lang="en-US" dirty="0" err="1"/>
@@ -5832,7 +6033,7 @@
             </a:r>
             <a:r>
               <a:rPr lang="en-US" dirty="0"/>
-              <a:t>=10.1371/journal.pone.0021101#pone-0021101-g001</a:t>
+              <a:t>=10.1371/journal.pone.0108451#s5</a:t>
             </a:r>
           </a:p>
         </p:txBody>
@@ -5840,7 +6041,7 @@
     </p:spTree>
     <p:extLst>
       <p:ext uri="{BB962C8B-B14F-4D97-AF65-F5344CB8AC3E}">
-        <p14:creationId xmlns:p14="http://schemas.microsoft.com/office/powerpoint/2010/main" val="4179202291"/>
+        <p14:creationId xmlns:p14="http://schemas.microsoft.com/office/powerpoint/2010/main" val="2126266482"/>
       </p:ext>
     </p:extLst>
   </p:cSld>
@@ -5875,8 +6076,8 @@
         </p:nvSpPr>
         <p:spPr>
           <a:xfrm>
-            <a:off x="825057" y="2280592"/>
-            <a:ext cx="12101953" cy="369332"/>
+            <a:off x="2484443" y="3643385"/>
+            <a:ext cx="9226467" cy="369332"/>
           </a:xfrm>
           <a:prstGeom prst="rect">
             <a:avLst/>
@@ -5895,7 +6096,7 @@
             </a:r>
             <a:r>
               <a:rPr lang="en-US" dirty="0" err="1"/>
-              <a:t>journals.lww.com</a:t>
+              <a:t>journals.plos.org</a:t>
             </a:r>
             <a:r>
               <a:rPr lang="en-US" dirty="0"/>
@@ -5903,11 +6104,19 @@
             </a:r>
             <a:r>
               <a:rPr lang="en-US" dirty="0" err="1"/>
-              <a:t>academicmedicine</a:t>
+              <a:t>plosone</a:t>
             </a:r>
             <a:r>
               <a:rPr lang="en-US" dirty="0"/>
-              <a:t>/Abstract/2006/02000/Data_Withholding_in_Genetics_and_the_Other_Life.6.aspx</a:t>
+              <a:t>/</a:t>
+            </a:r>
+            <a:r>
+              <a:rPr lang="en-US" dirty="0" err="1"/>
+              <a:t>article?id</a:t>
+            </a:r>
+            <a:r>
+              <a:rPr lang="en-US" dirty="0"/>
+              <a:t>=10.1371/journal.pone.0021101#pone-0021101-g001</a:t>
             </a:r>
           </a:p>
         </p:txBody>
@@ -5915,7 +6124,7 @@
     </p:spTree>
     <p:extLst>
       <p:ext uri="{BB962C8B-B14F-4D97-AF65-F5344CB8AC3E}">
-        <p14:creationId xmlns:p14="http://schemas.microsoft.com/office/powerpoint/2010/main" val="146087477"/>
+        <p14:creationId xmlns:p14="http://schemas.microsoft.com/office/powerpoint/2010/main" val="4179202291"/>
       </p:ext>
     </p:extLst>
   </p:cSld>

</xml_diff>